<commit_message>
Changed issue where settings preferences where always saved despite cancel button clicked
</commit_message>
<xml_diff>
--- a/Wiki pictures.pptx
+++ b/Wiki pictures.pptx
@@ -9,6 +9,11 @@
     <p:sldId id="257" r:id="rId3"/>
     <p:sldId id="258" r:id="rId4"/>
     <p:sldId id="259" r:id="rId5"/>
+    <p:sldId id="260" r:id="rId6"/>
+    <p:sldId id="261" r:id="rId7"/>
+    <p:sldId id="262" r:id="rId8"/>
+    <p:sldId id="263" r:id="rId9"/>
+    <p:sldId id="264" r:id="rId10"/>
   </p:sldIdLst>
   <p:sldSz cx="12192000" cy="6858000"/>
   <p:notesSz cx="6858000" cy="9144000"/>
@@ -107,7 +112,874 @@
       </a:defRPr>
     </a:lvl9pPr>
   </p:defaultTextStyle>
+  <p:extLst>
+    <p:ext uri="{EFAFB233-063F-42B5-8137-9DF3F51BA10A}">
+      <p15:sldGuideLst xmlns:p15="http://schemas.microsoft.com/office/powerpoint/2012/main"/>
+    </p:ext>
+  </p:extLst>
 </p:presentation>
+</file>
+
+<file path=ppt/revisionInfo.xml><?xml version="1.0" encoding="utf-8"?>
+<p1510:revInfo xmlns:a="http://schemas.openxmlformats.org/drawingml/2006/main" xmlns:r="http://schemas.openxmlformats.org/officeDocument/2006/relationships" xmlns:p1510="http://schemas.microsoft.com/office/powerpoint/2015/10/main">
+  <p1510:revLst>
+    <p1510:client id="{7FC49E0B-4C39-4278-BA91-EF3C6B8D800A}" v="31" dt="2024-09-20T18:46:04.499"/>
+  </p1510:revLst>
+</p1510:revInfo>
+</file>
+
+<file path=ppt/changesInfos/changesInfo1.xml><?xml version="1.0" encoding="utf-8"?>
+<pc:chgInfo xmlns:a="http://schemas.openxmlformats.org/drawingml/2006/main" xmlns:r="http://schemas.openxmlformats.org/officeDocument/2006/relationships" xmlns:ac="http://schemas.microsoft.com/office/drawing/2013/main/command" xmlns:pc="http://schemas.microsoft.com/office/powerpoint/2013/main/command">
+  <pc:docChgLst>
+    <pc:chgData name="Paul Ebbers" userId="68d1a23b9a453310" providerId="LiveId" clId="{7FC49E0B-4C39-4278-BA91-EF3C6B8D800A}"/>
+    <pc:docChg chg="undo custSel addSld modSld">
+      <pc:chgData name="Paul Ebbers" userId="68d1a23b9a453310" providerId="LiveId" clId="{7FC49E0B-4C39-4278-BA91-EF3C6B8D800A}" dt="2024-09-20T18:46:20.299" v="698" actId="14100"/>
+      <pc:docMkLst>
+        <pc:docMk/>
+      </pc:docMkLst>
+      <pc:sldChg chg="modSp mod">
+        <pc:chgData name="Paul Ebbers" userId="68d1a23b9a453310" providerId="LiveId" clId="{7FC49E0B-4C39-4278-BA91-EF3C6B8D800A}" dt="2024-09-20T18:24:52.832" v="687" actId="14100"/>
+        <pc:sldMkLst>
+          <pc:docMk/>
+          <pc:sldMk cId="4135510655" sldId="257"/>
+        </pc:sldMkLst>
+        <pc:spChg chg="mod">
+          <ac:chgData name="Paul Ebbers" userId="68d1a23b9a453310" providerId="LiveId" clId="{7FC49E0B-4C39-4278-BA91-EF3C6B8D800A}" dt="2024-09-20T18:24:44.729" v="686" actId="1076"/>
+          <ac:spMkLst>
+            <pc:docMk/>
+            <pc:sldMk cId="4135510655" sldId="257"/>
+            <ac:spMk id="16" creationId="{3BEC7679-6243-9539-DEA0-67958A326EE6}"/>
+          </ac:spMkLst>
+        </pc:spChg>
+        <pc:cxnChg chg="mod">
+          <ac:chgData name="Paul Ebbers" userId="68d1a23b9a453310" providerId="LiveId" clId="{7FC49E0B-4C39-4278-BA91-EF3C6B8D800A}" dt="2024-09-20T18:24:52.832" v="687" actId="14100"/>
+          <ac:cxnSpMkLst>
+            <pc:docMk/>
+            <pc:sldMk cId="4135510655" sldId="257"/>
+            <ac:cxnSpMk id="17" creationId="{538D9B40-8457-0E78-1C0C-BB8EA0F06650}"/>
+          </ac:cxnSpMkLst>
+        </pc:cxnChg>
+      </pc:sldChg>
+      <pc:sldChg chg="addSp modSp mod">
+        <pc:chgData name="Paul Ebbers" userId="68d1a23b9a453310" providerId="LiveId" clId="{7FC49E0B-4C39-4278-BA91-EF3C6B8D800A}" dt="2024-09-20T18:46:20.299" v="698" actId="14100"/>
+        <pc:sldMkLst>
+          <pc:docMk/>
+          <pc:sldMk cId="3161120032" sldId="258"/>
+        </pc:sldMkLst>
+        <pc:spChg chg="add mod">
+          <ac:chgData name="Paul Ebbers" userId="68d1a23b9a453310" providerId="LiveId" clId="{7FC49E0B-4C39-4278-BA91-EF3C6B8D800A}" dt="2024-09-20T18:45:33.541" v="691" actId="14100"/>
+          <ac:spMkLst>
+            <pc:docMk/>
+            <pc:sldMk cId="3161120032" sldId="258"/>
+            <ac:spMk id="2" creationId="{C8FECB05-A4A0-1AD6-CF24-492952BD0B7F}"/>
+          </ac:spMkLst>
+        </pc:spChg>
+        <pc:spChg chg="add mod">
+          <ac:chgData name="Paul Ebbers" userId="68d1a23b9a453310" providerId="LiveId" clId="{7FC49E0B-4C39-4278-BA91-EF3C6B8D800A}" dt="2024-09-20T18:46:20.299" v="698" actId="14100"/>
+          <ac:spMkLst>
+            <pc:docMk/>
+            <pc:sldMk cId="3161120032" sldId="258"/>
+            <ac:spMk id="5" creationId="{650A34A0-0A7A-A397-EA69-0391C5BD404E}"/>
+          </ac:spMkLst>
+        </pc:spChg>
+        <pc:spChg chg="mod">
+          <ac:chgData name="Paul Ebbers" userId="68d1a23b9a453310" providerId="LiveId" clId="{7FC49E0B-4C39-4278-BA91-EF3C6B8D800A}" dt="2024-09-20T18:45:58.810" v="693" actId="1076"/>
+          <ac:spMkLst>
+            <pc:docMk/>
+            <pc:sldMk cId="3161120032" sldId="258"/>
+            <ac:spMk id="12" creationId="{3B506162-1E84-DA17-106E-C0FA03392AFF}"/>
+          </ac:spMkLst>
+        </pc:spChg>
+        <pc:cxnChg chg="mod">
+          <ac:chgData name="Paul Ebbers" userId="68d1a23b9a453310" providerId="LiveId" clId="{7FC49E0B-4C39-4278-BA91-EF3C6B8D800A}" dt="2024-09-20T18:45:58.810" v="693" actId="1076"/>
+          <ac:cxnSpMkLst>
+            <pc:docMk/>
+            <pc:sldMk cId="3161120032" sldId="258"/>
+            <ac:cxnSpMk id="14" creationId="{DCBDFF8A-37E0-6944-114F-EFCA1973F9A2}"/>
+          </ac:cxnSpMkLst>
+        </pc:cxnChg>
+      </pc:sldChg>
+      <pc:sldChg chg="addSp delSp modSp mod">
+        <pc:chgData name="Paul Ebbers" userId="68d1a23b9a453310" providerId="LiveId" clId="{7FC49E0B-4C39-4278-BA91-EF3C6B8D800A}" dt="2024-09-20T18:07:39.565" v="425" actId="14100"/>
+        <pc:sldMkLst>
+          <pc:docMk/>
+          <pc:sldMk cId="3715892363" sldId="259"/>
+        </pc:sldMkLst>
+        <pc:spChg chg="add mod">
+          <ac:chgData name="Paul Ebbers" userId="68d1a23b9a453310" providerId="LiveId" clId="{7FC49E0B-4C39-4278-BA91-EF3C6B8D800A}" dt="2024-09-20T18:05:41.845" v="416" actId="14100"/>
+          <ac:spMkLst>
+            <pc:docMk/>
+            <pc:sldMk cId="3715892363" sldId="259"/>
+            <ac:spMk id="2" creationId="{5047E04E-F333-AD73-A3A0-B33344EF4F42}"/>
+          </ac:spMkLst>
+        </pc:spChg>
+        <pc:spChg chg="add mod">
+          <ac:chgData name="Paul Ebbers" userId="68d1a23b9a453310" providerId="LiveId" clId="{7FC49E0B-4C39-4278-BA91-EF3C6B8D800A}" dt="2024-09-20T18:07:07.947" v="421" actId="1076"/>
+          <ac:spMkLst>
+            <pc:docMk/>
+            <pc:sldMk cId="3715892363" sldId="259"/>
+            <ac:spMk id="4" creationId="{EE2C8A8D-3255-430D-058B-F36729E4F91F}"/>
+          </ac:spMkLst>
+        </pc:spChg>
+        <pc:spChg chg="del">
+          <ac:chgData name="Paul Ebbers" userId="68d1a23b9a453310" providerId="LiveId" clId="{7FC49E0B-4C39-4278-BA91-EF3C6B8D800A}" dt="2024-09-20T17:40:53.786" v="0" actId="478"/>
+          <ac:spMkLst>
+            <pc:docMk/>
+            <pc:sldMk cId="3715892363" sldId="259"/>
+            <ac:spMk id="12" creationId="{3B506162-1E84-DA17-106E-C0FA03392AFF}"/>
+          </ac:spMkLst>
+        </pc:spChg>
+        <pc:spChg chg="mod">
+          <ac:chgData name="Paul Ebbers" userId="68d1a23b9a453310" providerId="LiveId" clId="{7FC49E0B-4C39-4278-BA91-EF3C6B8D800A}" dt="2024-09-20T18:07:36.359" v="424" actId="1076"/>
+          <ac:spMkLst>
+            <pc:docMk/>
+            <pc:sldMk cId="3715892363" sldId="259"/>
+            <ac:spMk id="23" creationId="{1D00A2F5-EDE1-832E-EB43-CFBB316E7640}"/>
+          </ac:spMkLst>
+        </pc:spChg>
+        <pc:cxnChg chg="add mod">
+          <ac:chgData name="Paul Ebbers" userId="68d1a23b9a453310" providerId="LiveId" clId="{7FC49E0B-4C39-4278-BA91-EF3C6B8D800A}" dt="2024-09-20T18:05:41.845" v="416" actId="14100"/>
+          <ac:cxnSpMkLst>
+            <pc:docMk/>
+            <pc:sldMk cId="3715892363" sldId="259"/>
+            <ac:cxnSpMk id="3" creationId="{2ED95897-6E64-CD37-DA42-E6CB37920566}"/>
+          </ac:cxnSpMkLst>
+        </pc:cxnChg>
+        <pc:cxnChg chg="add mod">
+          <ac:chgData name="Paul Ebbers" userId="68d1a23b9a453310" providerId="LiveId" clId="{7FC49E0B-4C39-4278-BA91-EF3C6B8D800A}" dt="2024-09-20T18:07:07.947" v="421" actId="1076"/>
+          <ac:cxnSpMkLst>
+            <pc:docMk/>
+            <pc:sldMk cId="3715892363" sldId="259"/>
+            <ac:cxnSpMk id="5" creationId="{522D386F-00F7-840C-CB5D-4F30E1509A3A}"/>
+          </ac:cxnSpMkLst>
+        </pc:cxnChg>
+        <pc:cxnChg chg="del mod">
+          <ac:chgData name="Paul Ebbers" userId="68d1a23b9a453310" providerId="LiveId" clId="{7FC49E0B-4C39-4278-BA91-EF3C6B8D800A}" dt="2024-09-20T17:40:53.786" v="0" actId="478"/>
+          <ac:cxnSpMkLst>
+            <pc:docMk/>
+            <pc:sldMk cId="3715892363" sldId="259"/>
+            <ac:cxnSpMk id="14" creationId="{DCBDFF8A-37E0-6944-114F-EFCA1973F9A2}"/>
+          </ac:cxnSpMkLst>
+        </pc:cxnChg>
+        <pc:cxnChg chg="mod">
+          <ac:chgData name="Paul Ebbers" userId="68d1a23b9a453310" providerId="LiveId" clId="{7FC49E0B-4C39-4278-BA91-EF3C6B8D800A}" dt="2024-09-20T18:07:39.565" v="425" actId="14100"/>
+          <ac:cxnSpMkLst>
+            <pc:docMk/>
+            <pc:sldMk cId="3715892363" sldId="259"/>
+            <ac:cxnSpMk id="24" creationId="{AE17686D-DD5C-5F54-22C7-79EF4E303F87}"/>
+          </ac:cxnSpMkLst>
+        </pc:cxnChg>
+      </pc:sldChg>
+      <pc:sldChg chg="addSp delSp modSp new mod">
+        <pc:chgData name="Paul Ebbers" userId="68d1a23b9a453310" providerId="LiveId" clId="{7FC49E0B-4C39-4278-BA91-EF3C6B8D800A}" dt="2024-09-20T17:49:39.793" v="14" actId="167"/>
+        <pc:sldMkLst>
+          <pc:docMk/>
+          <pc:sldMk cId="637275875" sldId="260"/>
+        </pc:sldMkLst>
+        <pc:spChg chg="del mod">
+          <ac:chgData name="Paul Ebbers" userId="68d1a23b9a453310" providerId="LiveId" clId="{7FC49E0B-4C39-4278-BA91-EF3C6B8D800A}" dt="2024-09-20T17:41:47.288" v="5" actId="478"/>
+          <ac:spMkLst>
+            <pc:docMk/>
+            <pc:sldMk cId="637275875" sldId="260"/>
+            <ac:spMk id="2" creationId="{CE59AF01-4AD9-1F23-97C5-8415E3AD2724}"/>
+          </ac:spMkLst>
+        </pc:spChg>
+        <pc:spChg chg="del">
+          <ac:chgData name="Paul Ebbers" userId="68d1a23b9a453310" providerId="LiveId" clId="{7FC49E0B-4C39-4278-BA91-EF3C6B8D800A}" dt="2024-09-20T17:41:45.302" v="2"/>
+          <ac:spMkLst>
+            <pc:docMk/>
+            <pc:sldMk cId="637275875" sldId="260"/>
+            <ac:spMk id="3" creationId="{43625A08-23E2-8363-82B3-1B71D7C64C50}"/>
+          </ac:spMkLst>
+        </pc:spChg>
+        <pc:spChg chg="add mod">
+          <ac:chgData name="Paul Ebbers" userId="68d1a23b9a453310" providerId="LiveId" clId="{7FC49E0B-4C39-4278-BA91-EF3C6B8D800A}" dt="2024-09-20T17:42:10.392" v="6"/>
+          <ac:spMkLst>
+            <pc:docMk/>
+            <pc:sldMk cId="637275875" sldId="260"/>
+            <ac:spMk id="6" creationId="{B2589098-2DC0-9FA1-419E-5B5FC44A0B65}"/>
+          </ac:spMkLst>
+        </pc:spChg>
+        <pc:spChg chg="add mod">
+          <ac:chgData name="Paul Ebbers" userId="68d1a23b9a453310" providerId="LiveId" clId="{7FC49E0B-4C39-4278-BA91-EF3C6B8D800A}" dt="2024-09-20T17:42:10.392" v="6"/>
+          <ac:spMkLst>
+            <pc:docMk/>
+            <pc:sldMk cId="637275875" sldId="260"/>
+            <ac:spMk id="7" creationId="{AC1B5CB3-9EDF-B367-FC60-329CF720C344}"/>
+          </ac:spMkLst>
+        </pc:spChg>
+        <pc:spChg chg="add mod">
+          <ac:chgData name="Paul Ebbers" userId="68d1a23b9a453310" providerId="LiveId" clId="{7FC49E0B-4C39-4278-BA91-EF3C6B8D800A}" dt="2024-09-20T17:42:10.392" v="6"/>
+          <ac:spMkLst>
+            <pc:docMk/>
+            <pc:sldMk cId="637275875" sldId="260"/>
+            <ac:spMk id="9" creationId="{96A845B6-F3AD-44C2-8FF7-1B15840A93A1}"/>
+          </ac:spMkLst>
+        </pc:spChg>
+        <pc:spChg chg="add mod">
+          <ac:chgData name="Paul Ebbers" userId="68d1a23b9a453310" providerId="LiveId" clId="{7FC49E0B-4C39-4278-BA91-EF3C6B8D800A}" dt="2024-09-20T17:42:10.392" v="6"/>
+          <ac:spMkLst>
+            <pc:docMk/>
+            <pc:sldMk cId="637275875" sldId="260"/>
+            <ac:spMk id="11" creationId="{F4F16CBA-09AB-761D-BC23-30916641E91F}"/>
+          </ac:spMkLst>
+        </pc:spChg>
+        <pc:spChg chg="add mod">
+          <ac:chgData name="Paul Ebbers" userId="68d1a23b9a453310" providerId="LiveId" clId="{7FC49E0B-4C39-4278-BA91-EF3C6B8D800A}" dt="2024-09-20T17:42:23.893" v="8" actId="1076"/>
+          <ac:spMkLst>
+            <pc:docMk/>
+            <pc:sldMk cId="637275875" sldId="260"/>
+            <ac:spMk id="13" creationId="{07B75523-DDD6-CB6C-C896-FC4C74AECAF4}"/>
+          </ac:spMkLst>
+        </pc:spChg>
+        <pc:spChg chg="add del mod">
+          <ac:chgData name="Paul Ebbers" userId="68d1a23b9a453310" providerId="LiveId" clId="{7FC49E0B-4C39-4278-BA91-EF3C6B8D800A}" dt="2024-09-20T17:42:17.956" v="7" actId="478"/>
+          <ac:spMkLst>
+            <pc:docMk/>
+            <pc:sldMk cId="637275875" sldId="260"/>
+            <ac:spMk id="14" creationId="{92998E12-32A0-B16F-E8FA-FB8D25DBC260}"/>
+          </ac:spMkLst>
+        </pc:spChg>
+        <pc:spChg chg="add del mod">
+          <ac:chgData name="Paul Ebbers" userId="68d1a23b9a453310" providerId="LiveId" clId="{7FC49E0B-4C39-4278-BA91-EF3C6B8D800A}" dt="2024-09-20T17:49:35.190" v="11"/>
+          <ac:spMkLst>
+            <pc:docMk/>
+            <pc:sldMk cId="637275875" sldId="260"/>
+            <ac:spMk id="17" creationId="{6D9654CE-C6F1-EF44-814F-28C71E3B8AA4}"/>
+          </ac:spMkLst>
+        </pc:spChg>
+        <pc:picChg chg="add del mod">
+          <ac:chgData name="Paul Ebbers" userId="68d1a23b9a453310" providerId="LiveId" clId="{7FC49E0B-4C39-4278-BA91-EF3C6B8D800A}" dt="2024-09-20T17:49:34.811" v="10" actId="478"/>
+          <ac:picMkLst>
+            <pc:docMk/>
+            <pc:sldMk cId="637275875" sldId="260"/>
+            <ac:picMk id="5" creationId="{C974C331-006C-7C38-8D06-2EC927BDB034}"/>
+          </ac:picMkLst>
+        </pc:picChg>
+        <pc:picChg chg="add mod ord">
+          <ac:chgData name="Paul Ebbers" userId="68d1a23b9a453310" providerId="LiveId" clId="{7FC49E0B-4C39-4278-BA91-EF3C6B8D800A}" dt="2024-09-20T17:49:39.793" v="14" actId="167"/>
+          <ac:picMkLst>
+            <pc:docMk/>
+            <pc:sldMk cId="637275875" sldId="260"/>
+            <ac:picMk id="19" creationId="{CFA3CEE3-8EAC-3FDC-52D5-95429C8624B5}"/>
+          </ac:picMkLst>
+        </pc:picChg>
+        <pc:cxnChg chg="add mod">
+          <ac:chgData name="Paul Ebbers" userId="68d1a23b9a453310" providerId="LiveId" clId="{7FC49E0B-4C39-4278-BA91-EF3C6B8D800A}" dt="2024-09-20T17:42:10.392" v="6"/>
+          <ac:cxnSpMkLst>
+            <pc:docMk/>
+            <pc:sldMk cId="637275875" sldId="260"/>
+            <ac:cxnSpMk id="8" creationId="{0924C449-A7E7-6028-4674-D312ED7041E1}"/>
+          </ac:cxnSpMkLst>
+        </pc:cxnChg>
+        <pc:cxnChg chg="add mod">
+          <ac:chgData name="Paul Ebbers" userId="68d1a23b9a453310" providerId="LiveId" clId="{7FC49E0B-4C39-4278-BA91-EF3C6B8D800A}" dt="2024-09-20T17:42:10.392" v="6"/>
+          <ac:cxnSpMkLst>
+            <pc:docMk/>
+            <pc:sldMk cId="637275875" sldId="260"/>
+            <ac:cxnSpMk id="10" creationId="{177555F3-26FC-2244-2FDC-E94AC7849A8B}"/>
+          </ac:cxnSpMkLst>
+        </pc:cxnChg>
+        <pc:cxnChg chg="add mod">
+          <ac:chgData name="Paul Ebbers" userId="68d1a23b9a453310" providerId="LiveId" clId="{7FC49E0B-4C39-4278-BA91-EF3C6B8D800A}" dt="2024-09-20T17:42:54.296" v="9" actId="14100"/>
+          <ac:cxnSpMkLst>
+            <pc:docMk/>
+            <pc:sldMk cId="637275875" sldId="260"/>
+            <ac:cxnSpMk id="12" creationId="{CF3D3301-5FC8-AAB7-EAE2-D304946D3274}"/>
+          </ac:cxnSpMkLst>
+        </pc:cxnChg>
+      </pc:sldChg>
+      <pc:sldChg chg="addSp delSp modSp new mod">
+        <pc:chgData name="Paul Ebbers" userId="68d1a23b9a453310" providerId="LiveId" clId="{7FC49E0B-4C39-4278-BA91-EF3C6B8D800A}" dt="2024-09-20T18:05:00.813" v="390" actId="14100"/>
+        <pc:sldMkLst>
+          <pc:docMk/>
+          <pc:sldMk cId="3054600370" sldId="261"/>
+        </pc:sldMkLst>
+        <pc:spChg chg="del">
+          <ac:chgData name="Paul Ebbers" userId="68d1a23b9a453310" providerId="LiveId" clId="{7FC49E0B-4C39-4278-BA91-EF3C6B8D800A}" dt="2024-09-20T17:50:15.993" v="16" actId="478"/>
+          <ac:spMkLst>
+            <pc:docMk/>
+            <pc:sldMk cId="3054600370" sldId="261"/>
+            <ac:spMk id="2" creationId="{A0A21F4C-543E-CA5D-0832-B4E8F8317DA3}"/>
+          </ac:spMkLst>
+        </pc:spChg>
+        <pc:spChg chg="del">
+          <ac:chgData name="Paul Ebbers" userId="68d1a23b9a453310" providerId="LiveId" clId="{7FC49E0B-4C39-4278-BA91-EF3C6B8D800A}" dt="2024-09-20T17:50:46.397" v="17"/>
+          <ac:spMkLst>
+            <pc:docMk/>
+            <pc:sldMk cId="3054600370" sldId="261"/>
+            <ac:spMk id="3" creationId="{6A8733FB-E6C3-D741-AB8E-07A0FCB9400D}"/>
+          </ac:spMkLst>
+        </pc:spChg>
+        <pc:spChg chg="add del mod">
+          <ac:chgData name="Paul Ebbers" userId="68d1a23b9a453310" providerId="LiveId" clId="{7FC49E0B-4C39-4278-BA91-EF3C6B8D800A}" dt="2024-09-20T17:51:16.678" v="24" actId="478"/>
+          <ac:spMkLst>
+            <pc:docMk/>
+            <pc:sldMk cId="3054600370" sldId="261"/>
+            <ac:spMk id="6" creationId="{139F7A38-746C-71A8-F546-95422AB57D87}"/>
+          </ac:spMkLst>
+        </pc:spChg>
+        <pc:spChg chg="add del mod">
+          <ac:chgData name="Paul Ebbers" userId="68d1a23b9a453310" providerId="LiveId" clId="{7FC49E0B-4C39-4278-BA91-EF3C6B8D800A}" dt="2024-09-20T17:51:16.678" v="24" actId="478"/>
+          <ac:spMkLst>
+            <pc:docMk/>
+            <pc:sldMk cId="3054600370" sldId="261"/>
+            <ac:spMk id="7" creationId="{F05CBF8F-70B9-04E3-8907-261D2B12443C}"/>
+          </ac:spMkLst>
+        </pc:spChg>
+        <pc:spChg chg="add mod">
+          <ac:chgData name="Paul Ebbers" userId="68d1a23b9a453310" providerId="LiveId" clId="{7FC49E0B-4C39-4278-BA91-EF3C6B8D800A}" dt="2024-09-20T17:51:28.840" v="36" actId="14100"/>
+          <ac:spMkLst>
+            <pc:docMk/>
+            <pc:sldMk cId="3054600370" sldId="261"/>
+            <ac:spMk id="9" creationId="{536B246E-F5AD-10E2-38D0-76F6CDC2F4D9}"/>
+          </ac:spMkLst>
+        </pc:spChg>
+        <pc:spChg chg="add mod">
+          <ac:chgData name="Paul Ebbers" userId="68d1a23b9a453310" providerId="LiveId" clId="{7FC49E0B-4C39-4278-BA91-EF3C6B8D800A}" dt="2024-09-20T17:51:39.174" v="47" actId="14100"/>
+          <ac:spMkLst>
+            <pc:docMk/>
+            <pc:sldMk cId="3054600370" sldId="261"/>
+            <ac:spMk id="11" creationId="{F9BDD7EF-CC7A-A3D0-C594-08B12B549162}"/>
+          </ac:spMkLst>
+        </pc:spChg>
+        <pc:spChg chg="add mod">
+          <ac:chgData name="Paul Ebbers" userId="68d1a23b9a453310" providerId="LiveId" clId="{7FC49E0B-4C39-4278-BA91-EF3C6B8D800A}" dt="2024-09-20T17:51:03.233" v="22" actId="1076"/>
+          <ac:spMkLst>
+            <pc:docMk/>
+            <pc:sldMk cId="3054600370" sldId="261"/>
+            <ac:spMk id="13" creationId="{AF1BCEA3-2371-5398-8F4B-497C00462DAA}"/>
+          </ac:spMkLst>
+        </pc:spChg>
+        <pc:spChg chg="add mod">
+          <ac:chgData name="Paul Ebbers" userId="68d1a23b9a453310" providerId="LiveId" clId="{7FC49E0B-4C39-4278-BA91-EF3C6B8D800A}" dt="2024-09-20T18:05:00.813" v="390" actId="14100"/>
+          <ac:spMkLst>
+            <pc:docMk/>
+            <pc:sldMk cId="3054600370" sldId="261"/>
+            <ac:spMk id="16" creationId="{D3A44498-4DBE-DFA6-D3A0-A14F52D76BF0}"/>
+          </ac:spMkLst>
+        </pc:spChg>
+        <pc:spChg chg="add del mod">
+          <ac:chgData name="Paul Ebbers" userId="68d1a23b9a453310" providerId="LiveId" clId="{7FC49E0B-4C39-4278-BA91-EF3C6B8D800A}" dt="2024-09-20T18:04:37.007" v="368" actId="478"/>
+          <ac:spMkLst>
+            <pc:docMk/>
+            <pc:sldMk cId="3054600370" sldId="261"/>
+            <ac:spMk id="18" creationId="{9A7840C0-4F54-EB2C-2182-3E3C745D292C}"/>
+          </ac:spMkLst>
+        </pc:spChg>
+        <pc:picChg chg="add mod">
+          <ac:chgData name="Paul Ebbers" userId="68d1a23b9a453310" providerId="LiveId" clId="{7FC49E0B-4C39-4278-BA91-EF3C6B8D800A}" dt="2024-09-20T17:51:07.418" v="23" actId="1076"/>
+          <ac:picMkLst>
+            <pc:docMk/>
+            <pc:sldMk cId="3054600370" sldId="261"/>
+            <ac:picMk id="5" creationId="{6C4883BE-756B-0A1D-B24E-14CBB7ECF390}"/>
+          </ac:picMkLst>
+        </pc:picChg>
+        <pc:cxnChg chg="add del mod">
+          <ac:chgData name="Paul Ebbers" userId="68d1a23b9a453310" providerId="LiveId" clId="{7FC49E0B-4C39-4278-BA91-EF3C6B8D800A}" dt="2024-09-20T17:51:16.678" v="24" actId="478"/>
+          <ac:cxnSpMkLst>
+            <pc:docMk/>
+            <pc:sldMk cId="3054600370" sldId="261"/>
+            <ac:cxnSpMk id="8" creationId="{E783E14E-8BBE-F813-2703-33A5720BC5B6}"/>
+          </ac:cxnSpMkLst>
+        </pc:cxnChg>
+        <pc:cxnChg chg="add mod">
+          <ac:chgData name="Paul Ebbers" userId="68d1a23b9a453310" providerId="LiveId" clId="{7FC49E0B-4C39-4278-BA91-EF3C6B8D800A}" dt="2024-09-20T17:51:28.840" v="36" actId="14100"/>
+          <ac:cxnSpMkLst>
+            <pc:docMk/>
+            <pc:sldMk cId="3054600370" sldId="261"/>
+            <ac:cxnSpMk id="10" creationId="{4E362287-F2EC-6DB8-839A-EC9F3890F022}"/>
+          </ac:cxnSpMkLst>
+        </pc:cxnChg>
+        <pc:cxnChg chg="add mod">
+          <ac:chgData name="Paul Ebbers" userId="68d1a23b9a453310" providerId="LiveId" clId="{7FC49E0B-4C39-4278-BA91-EF3C6B8D800A}" dt="2024-09-20T17:51:39.174" v="47" actId="14100"/>
+          <ac:cxnSpMkLst>
+            <pc:docMk/>
+            <pc:sldMk cId="3054600370" sldId="261"/>
+            <ac:cxnSpMk id="12" creationId="{4ADEE961-F8B4-4D73-F19E-450B9FC458A0}"/>
+          </ac:cxnSpMkLst>
+        </pc:cxnChg>
+        <pc:cxnChg chg="add mod">
+          <ac:chgData name="Paul Ebbers" userId="68d1a23b9a453310" providerId="LiveId" clId="{7FC49E0B-4C39-4278-BA91-EF3C6B8D800A}" dt="2024-09-20T18:05:00.813" v="390" actId="14100"/>
+          <ac:cxnSpMkLst>
+            <pc:docMk/>
+            <pc:sldMk cId="3054600370" sldId="261"/>
+            <ac:cxnSpMk id="17" creationId="{C10967E9-BFDC-FF92-4B9C-E692FF2DB786}"/>
+          </ac:cxnSpMkLst>
+        </pc:cxnChg>
+        <pc:cxnChg chg="add del mod">
+          <ac:chgData name="Paul Ebbers" userId="68d1a23b9a453310" providerId="LiveId" clId="{7FC49E0B-4C39-4278-BA91-EF3C6B8D800A}" dt="2024-09-20T18:04:37.007" v="368" actId="478"/>
+          <ac:cxnSpMkLst>
+            <pc:docMk/>
+            <pc:sldMk cId="3054600370" sldId="261"/>
+            <ac:cxnSpMk id="19" creationId="{38048A1E-C8A8-4C4D-DB40-F810C1D40F97}"/>
+          </ac:cxnSpMkLst>
+        </pc:cxnChg>
+      </pc:sldChg>
+      <pc:sldChg chg="addSp delSp modSp new mod">
+        <pc:chgData name="Paul Ebbers" userId="68d1a23b9a453310" providerId="LiveId" clId="{7FC49E0B-4C39-4278-BA91-EF3C6B8D800A}" dt="2024-09-20T18:11:15.459" v="456" actId="14100"/>
+        <pc:sldMkLst>
+          <pc:docMk/>
+          <pc:sldMk cId="1855102817" sldId="262"/>
+        </pc:sldMkLst>
+        <pc:spChg chg="del">
+          <ac:chgData name="Paul Ebbers" userId="68d1a23b9a453310" providerId="LiveId" clId="{7FC49E0B-4C39-4278-BA91-EF3C6B8D800A}" dt="2024-09-20T17:52:15.750" v="52" actId="478"/>
+          <ac:spMkLst>
+            <pc:docMk/>
+            <pc:sldMk cId="1855102817" sldId="262"/>
+            <ac:spMk id="2" creationId="{156EE715-70FC-0C37-E6F0-7BCECCE7DF84}"/>
+          </ac:spMkLst>
+        </pc:spChg>
+        <pc:spChg chg="del">
+          <ac:chgData name="Paul Ebbers" userId="68d1a23b9a453310" providerId="LiveId" clId="{7FC49E0B-4C39-4278-BA91-EF3C6B8D800A}" dt="2024-09-20T17:52:13.263" v="49"/>
+          <ac:spMkLst>
+            <pc:docMk/>
+            <pc:sldMk cId="1855102817" sldId="262"/>
+            <ac:spMk id="3" creationId="{6FAAA107-C2F2-4FE4-004F-2FAD210502ED}"/>
+          </ac:spMkLst>
+        </pc:spChg>
+        <pc:spChg chg="add del mod">
+          <ac:chgData name="Paul Ebbers" userId="68d1a23b9a453310" providerId="LiveId" clId="{7FC49E0B-4C39-4278-BA91-EF3C6B8D800A}" dt="2024-09-20T17:55:24.732" v="68" actId="478"/>
+          <ac:spMkLst>
+            <pc:docMk/>
+            <pc:sldMk cId="1855102817" sldId="262"/>
+            <ac:spMk id="6" creationId="{8167CF84-7ED1-62A2-5C55-50756DB91601}"/>
+          </ac:spMkLst>
+        </pc:spChg>
+        <pc:spChg chg="add mod">
+          <ac:chgData name="Paul Ebbers" userId="68d1a23b9a453310" providerId="LiveId" clId="{7FC49E0B-4C39-4278-BA91-EF3C6B8D800A}" dt="2024-09-20T17:57:52.709" v="177" actId="14100"/>
+          <ac:spMkLst>
+            <pc:docMk/>
+            <pc:sldMk cId="1855102817" sldId="262"/>
+            <ac:spMk id="7" creationId="{F88312ED-7E47-94E3-7FE4-FCE3ACA02173}"/>
+          </ac:spMkLst>
+        </pc:spChg>
+        <pc:spChg chg="add mod">
+          <ac:chgData name="Paul Ebbers" userId="68d1a23b9a453310" providerId="LiveId" clId="{7FC49E0B-4C39-4278-BA91-EF3C6B8D800A}" dt="2024-09-20T18:03:19.257" v="322" actId="1076"/>
+          <ac:spMkLst>
+            <pc:docMk/>
+            <pc:sldMk cId="1855102817" sldId="262"/>
+            <ac:spMk id="9" creationId="{2F5F8255-0DD3-D163-021F-C34F1F51322C}"/>
+          </ac:spMkLst>
+        </pc:spChg>
+        <pc:spChg chg="add mod">
+          <ac:chgData name="Paul Ebbers" userId="68d1a23b9a453310" providerId="LiveId" clId="{7FC49E0B-4C39-4278-BA91-EF3C6B8D800A}" dt="2024-09-20T18:03:00.607" v="318" actId="1076"/>
+          <ac:spMkLst>
+            <pc:docMk/>
+            <pc:sldMk cId="1855102817" sldId="262"/>
+            <ac:spMk id="11" creationId="{94169275-7275-F2E1-CD14-E969B6F0B1C7}"/>
+          </ac:spMkLst>
+        </pc:spChg>
+        <pc:spChg chg="add mod">
+          <ac:chgData name="Paul Ebbers" userId="68d1a23b9a453310" providerId="LiveId" clId="{7FC49E0B-4C39-4278-BA91-EF3C6B8D800A}" dt="2024-09-20T17:55:22.066" v="67" actId="14100"/>
+          <ac:spMkLst>
+            <pc:docMk/>
+            <pc:sldMk cId="1855102817" sldId="262"/>
+            <ac:spMk id="13" creationId="{AC0B82A3-6D15-AB41-12EB-1621B6C88E97}"/>
+          </ac:spMkLst>
+        </pc:spChg>
+        <pc:spChg chg="add mod">
+          <ac:chgData name="Paul Ebbers" userId="68d1a23b9a453310" providerId="LiveId" clId="{7FC49E0B-4C39-4278-BA91-EF3C6B8D800A}" dt="2024-09-20T17:52:29.215" v="53"/>
+          <ac:spMkLst>
+            <pc:docMk/>
+            <pc:sldMk cId="1855102817" sldId="262"/>
+            <ac:spMk id="14" creationId="{73FD7167-2B09-97BF-E2BA-4255EE366A6C}"/>
+          </ac:spMkLst>
+        </pc:spChg>
+        <pc:spChg chg="add del mod">
+          <ac:chgData name="Paul Ebbers" userId="68d1a23b9a453310" providerId="LiveId" clId="{7FC49E0B-4C39-4278-BA91-EF3C6B8D800A}" dt="2024-09-20T17:55:04.761" v="64" actId="22"/>
+          <ac:spMkLst>
+            <pc:docMk/>
+            <pc:sldMk cId="1855102817" sldId="262"/>
+            <ac:spMk id="16" creationId="{295B9FFB-E983-474F-9B44-F0B36EDF59C7}"/>
+          </ac:spMkLst>
+        </pc:spChg>
+        <pc:spChg chg="add mod">
+          <ac:chgData name="Paul Ebbers" userId="68d1a23b9a453310" providerId="LiveId" clId="{7FC49E0B-4C39-4278-BA91-EF3C6B8D800A}" dt="2024-09-20T18:11:15.459" v="456" actId="14100"/>
+          <ac:spMkLst>
+            <pc:docMk/>
+            <pc:sldMk cId="1855102817" sldId="262"/>
+            <ac:spMk id="23" creationId="{CA3FA59D-D70B-46CF-D034-A241311A8BC2}"/>
+          </ac:spMkLst>
+        </pc:spChg>
+        <pc:spChg chg="add mod">
+          <ac:chgData name="Paul Ebbers" userId="68d1a23b9a453310" providerId="LiveId" clId="{7FC49E0B-4C39-4278-BA91-EF3C6B8D800A}" dt="2024-09-20T17:58:44.145" v="246" actId="14100"/>
+          <ac:spMkLst>
+            <pc:docMk/>
+            <pc:sldMk cId="1855102817" sldId="262"/>
+            <ac:spMk id="30" creationId="{596A8825-0A43-FFD4-C3A5-08CDDF7D44AB}"/>
+          </ac:spMkLst>
+        </pc:spChg>
+        <pc:spChg chg="add mod">
+          <ac:chgData name="Paul Ebbers" userId="68d1a23b9a453310" providerId="LiveId" clId="{7FC49E0B-4C39-4278-BA91-EF3C6B8D800A}" dt="2024-09-20T18:00:28.993" v="278" actId="1076"/>
+          <ac:spMkLst>
+            <pc:docMk/>
+            <pc:sldMk cId="1855102817" sldId="262"/>
+            <ac:spMk id="34" creationId="{7EBD6304-CAF8-3AFF-D0BA-4D89673669B2}"/>
+          </ac:spMkLst>
+        </pc:spChg>
+        <pc:spChg chg="add mod">
+          <ac:chgData name="Paul Ebbers" userId="68d1a23b9a453310" providerId="LiveId" clId="{7FC49E0B-4C39-4278-BA91-EF3C6B8D800A}" dt="2024-09-20T18:00:16.261" v="277" actId="20577"/>
+          <ac:spMkLst>
+            <pc:docMk/>
+            <pc:sldMk cId="1855102817" sldId="262"/>
+            <ac:spMk id="37" creationId="{D36DCC47-B4A7-0BB8-2D2C-7C4E0438B661}"/>
+          </ac:spMkLst>
+        </pc:spChg>
+        <pc:spChg chg="add mod">
+          <ac:chgData name="Paul Ebbers" userId="68d1a23b9a453310" providerId="LiveId" clId="{7FC49E0B-4C39-4278-BA91-EF3C6B8D800A}" dt="2024-09-20T18:03:12.297" v="320" actId="1076"/>
+          <ac:spMkLst>
+            <pc:docMk/>
+            <pc:sldMk cId="1855102817" sldId="262"/>
+            <ac:spMk id="43" creationId="{AAB97CE3-2129-8055-3E08-64471B2F773D}"/>
+          </ac:spMkLst>
+        </pc:spChg>
+        <pc:spChg chg="add mod">
+          <ac:chgData name="Paul Ebbers" userId="68d1a23b9a453310" providerId="LiveId" clId="{7FC49E0B-4C39-4278-BA91-EF3C6B8D800A}" dt="2024-09-20T18:03:46.312" v="328" actId="1076"/>
+          <ac:spMkLst>
+            <pc:docMk/>
+            <pc:sldMk cId="1855102817" sldId="262"/>
+            <ac:spMk id="51" creationId="{08D2C40B-8E28-6B96-DC84-CBB4B1EE1526}"/>
+          </ac:spMkLst>
+        </pc:spChg>
+        <pc:spChg chg="add mod">
+          <ac:chgData name="Paul Ebbers" userId="68d1a23b9a453310" providerId="LiveId" clId="{7FC49E0B-4C39-4278-BA91-EF3C6B8D800A}" dt="2024-09-20T18:04:16.148" v="366" actId="14100"/>
+          <ac:spMkLst>
+            <pc:docMk/>
+            <pc:sldMk cId="1855102817" sldId="262"/>
+            <ac:spMk id="54" creationId="{5871B5E6-226E-93ED-FFE2-808A1273083F}"/>
+          </ac:spMkLst>
+        </pc:spChg>
+        <pc:picChg chg="add del mod">
+          <ac:chgData name="Paul Ebbers" userId="68d1a23b9a453310" providerId="LiveId" clId="{7FC49E0B-4C39-4278-BA91-EF3C6B8D800A}" dt="2024-09-20T17:55:01.960" v="63" actId="478"/>
+          <ac:picMkLst>
+            <pc:docMk/>
+            <pc:sldMk cId="1855102817" sldId="262"/>
+            <ac:picMk id="5" creationId="{BFF96361-6CBF-8172-E552-17DE5D1FE7D2}"/>
+          </ac:picMkLst>
+        </pc:picChg>
+        <pc:picChg chg="add mod ord">
+          <ac:chgData name="Paul Ebbers" userId="68d1a23b9a453310" providerId="LiveId" clId="{7FC49E0B-4C39-4278-BA91-EF3C6B8D800A}" dt="2024-09-20T17:55:15.231" v="66" actId="1076"/>
+          <ac:picMkLst>
+            <pc:docMk/>
+            <pc:sldMk cId="1855102817" sldId="262"/>
+            <ac:picMk id="18" creationId="{C240941A-82E0-F7A8-F8D5-DE6F9A5979F7}"/>
+          </ac:picMkLst>
+        </pc:picChg>
+        <pc:cxnChg chg="add mod">
+          <ac:chgData name="Paul Ebbers" userId="68d1a23b9a453310" providerId="LiveId" clId="{7FC49E0B-4C39-4278-BA91-EF3C6B8D800A}" dt="2024-09-20T17:57:52.709" v="177" actId="14100"/>
+          <ac:cxnSpMkLst>
+            <pc:docMk/>
+            <pc:sldMk cId="1855102817" sldId="262"/>
+            <ac:cxnSpMk id="8" creationId="{0EC02992-18C9-5AF5-3D7C-A8B9138D1AAB}"/>
+          </ac:cxnSpMkLst>
+        </pc:cxnChg>
+        <pc:cxnChg chg="add mod">
+          <ac:chgData name="Paul Ebbers" userId="68d1a23b9a453310" providerId="LiveId" clId="{7FC49E0B-4C39-4278-BA91-EF3C6B8D800A}" dt="2024-09-20T18:03:23.819" v="323" actId="14100"/>
+          <ac:cxnSpMkLst>
+            <pc:docMk/>
+            <pc:sldMk cId="1855102817" sldId="262"/>
+            <ac:cxnSpMk id="10" creationId="{7260D10E-8B1A-5D6D-4959-7BA7CA33E0BF}"/>
+          </ac:cxnSpMkLst>
+        </pc:cxnChg>
+        <pc:cxnChg chg="add mod">
+          <ac:chgData name="Paul Ebbers" userId="68d1a23b9a453310" providerId="LiveId" clId="{7FC49E0B-4C39-4278-BA91-EF3C6B8D800A}" dt="2024-09-20T18:03:05.671" v="319" actId="14100"/>
+          <ac:cxnSpMkLst>
+            <pc:docMk/>
+            <pc:sldMk cId="1855102817" sldId="262"/>
+            <ac:cxnSpMk id="12" creationId="{6113C080-C7E3-90E1-9E43-4D5CF6D92245}"/>
+          </ac:cxnSpMkLst>
+        </pc:cxnChg>
+        <pc:cxnChg chg="add mod">
+          <ac:chgData name="Paul Ebbers" userId="68d1a23b9a453310" providerId="LiveId" clId="{7FC49E0B-4C39-4278-BA91-EF3C6B8D800A}" dt="2024-09-20T18:11:15.459" v="456" actId="14100"/>
+          <ac:cxnSpMkLst>
+            <pc:docMk/>
+            <pc:sldMk cId="1855102817" sldId="262"/>
+            <ac:cxnSpMk id="24" creationId="{6A47A634-49A8-D53E-FBBB-4AA95CAD0563}"/>
+          </ac:cxnSpMkLst>
+        </pc:cxnChg>
+        <pc:cxnChg chg="add mod">
+          <ac:chgData name="Paul Ebbers" userId="68d1a23b9a453310" providerId="LiveId" clId="{7FC49E0B-4C39-4278-BA91-EF3C6B8D800A}" dt="2024-09-20T17:58:44.145" v="246" actId="14100"/>
+          <ac:cxnSpMkLst>
+            <pc:docMk/>
+            <pc:sldMk cId="1855102817" sldId="262"/>
+            <ac:cxnSpMk id="31" creationId="{1CF6244B-A4EB-4FE3-923A-604EF249773D}"/>
+          </ac:cxnSpMkLst>
+        </pc:cxnChg>
+        <pc:cxnChg chg="add mod">
+          <ac:chgData name="Paul Ebbers" userId="68d1a23b9a453310" providerId="LiveId" clId="{7FC49E0B-4C39-4278-BA91-EF3C6B8D800A}" dt="2024-09-20T18:00:32.795" v="279" actId="14100"/>
+          <ac:cxnSpMkLst>
+            <pc:docMk/>
+            <pc:sldMk cId="1855102817" sldId="262"/>
+            <ac:cxnSpMk id="35" creationId="{8B59A17B-13A2-6048-FA4F-2E4836DF0E96}"/>
+          </ac:cxnSpMkLst>
+        </pc:cxnChg>
+        <pc:cxnChg chg="add mod">
+          <ac:chgData name="Paul Ebbers" userId="68d1a23b9a453310" providerId="LiveId" clId="{7FC49E0B-4C39-4278-BA91-EF3C6B8D800A}" dt="2024-09-20T18:00:16.261" v="277" actId="20577"/>
+          <ac:cxnSpMkLst>
+            <pc:docMk/>
+            <pc:sldMk cId="1855102817" sldId="262"/>
+            <ac:cxnSpMk id="38" creationId="{8A05335B-F278-4DCF-8AC2-6B6433BCAD1B}"/>
+          </ac:cxnSpMkLst>
+        </pc:cxnChg>
+        <pc:cxnChg chg="add mod">
+          <ac:chgData name="Paul Ebbers" userId="68d1a23b9a453310" providerId="LiveId" clId="{7FC49E0B-4C39-4278-BA91-EF3C6B8D800A}" dt="2024-09-20T18:03:16.327" v="321" actId="14100"/>
+          <ac:cxnSpMkLst>
+            <pc:docMk/>
+            <pc:sldMk cId="1855102817" sldId="262"/>
+            <ac:cxnSpMk id="44" creationId="{69C3798F-70D1-27B1-EA42-978069DB4095}"/>
+          </ac:cxnSpMkLst>
+        </pc:cxnChg>
+        <pc:cxnChg chg="add mod">
+          <ac:chgData name="Paul Ebbers" userId="68d1a23b9a453310" providerId="LiveId" clId="{7FC49E0B-4C39-4278-BA91-EF3C6B8D800A}" dt="2024-09-20T18:03:46.312" v="328" actId="1076"/>
+          <ac:cxnSpMkLst>
+            <pc:docMk/>
+            <pc:sldMk cId="1855102817" sldId="262"/>
+            <ac:cxnSpMk id="52" creationId="{42020CDA-D1B3-CBD0-53DB-2F782C4F890C}"/>
+          </ac:cxnSpMkLst>
+        </pc:cxnChg>
+        <pc:cxnChg chg="add mod">
+          <ac:chgData name="Paul Ebbers" userId="68d1a23b9a453310" providerId="LiveId" clId="{7FC49E0B-4C39-4278-BA91-EF3C6B8D800A}" dt="2024-09-20T18:04:16.148" v="366" actId="14100"/>
+          <ac:cxnSpMkLst>
+            <pc:docMk/>
+            <pc:sldMk cId="1855102817" sldId="262"/>
+            <ac:cxnSpMk id="55" creationId="{51D44EE5-8017-D3A2-0B44-DDD660F3D486}"/>
+          </ac:cxnSpMkLst>
+        </pc:cxnChg>
+      </pc:sldChg>
+      <pc:sldChg chg="addSp delSp modSp new mod">
+        <pc:chgData name="Paul Ebbers" userId="68d1a23b9a453310" providerId="LiveId" clId="{7FC49E0B-4C39-4278-BA91-EF3C6B8D800A}" dt="2024-09-20T18:17:07.261" v="671" actId="14100"/>
+        <pc:sldMkLst>
+          <pc:docMk/>
+          <pc:sldMk cId="3214827965" sldId="263"/>
+        </pc:sldMkLst>
+        <pc:spChg chg="del">
+          <ac:chgData name="Paul Ebbers" userId="68d1a23b9a453310" providerId="LiveId" clId="{7FC49E0B-4C39-4278-BA91-EF3C6B8D800A}" dt="2024-09-20T18:09:25.282" v="430" actId="478"/>
+          <ac:spMkLst>
+            <pc:docMk/>
+            <pc:sldMk cId="3214827965" sldId="263"/>
+            <ac:spMk id="2" creationId="{7FE15526-3859-9F14-761B-27529689B26B}"/>
+          </ac:spMkLst>
+        </pc:spChg>
+        <pc:spChg chg="del">
+          <ac:chgData name="Paul Ebbers" userId="68d1a23b9a453310" providerId="LiveId" clId="{7FC49E0B-4C39-4278-BA91-EF3C6B8D800A}" dt="2024-09-20T18:09:22.147" v="427"/>
+          <ac:spMkLst>
+            <pc:docMk/>
+            <pc:sldMk cId="3214827965" sldId="263"/>
+            <ac:spMk id="3" creationId="{47112FE6-AC17-2D68-AD74-E34E47593E5D}"/>
+          </ac:spMkLst>
+        </pc:spChg>
+        <pc:spChg chg="add mod">
+          <ac:chgData name="Paul Ebbers" userId="68d1a23b9a453310" providerId="LiveId" clId="{7FC49E0B-4C39-4278-BA91-EF3C6B8D800A}" dt="2024-09-20T18:10:07.796" v="435" actId="1076"/>
+          <ac:spMkLst>
+            <pc:docMk/>
+            <pc:sldMk cId="3214827965" sldId="263"/>
+            <ac:spMk id="6" creationId="{20207BFB-6B73-E5D5-F422-A6DF64B8CAD0}"/>
+          </ac:spMkLst>
+        </pc:spChg>
+        <pc:spChg chg="add mod">
+          <ac:chgData name="Paul Ebbers" userId="68d1a23b9a453310" providerId="LiveId" clId="{7FC49E0B-4C39-4278-BA91-EF3C6B8D800A}" dt="2024-09-20T18:09:56.214" v="432" actId="1076"/>
+          <ac:spMkLst>
+            <pc:docMk/>
+            <pc:sldMk cId="3214827965" sldId="263"/>
+            <ac:spMk id="7" creationId="{76693E6D-A54B-CBAD-9B11-75DAF7DF9060}"/>
+          </ac:spMkLst>
+        </pc:spChg>
+        <pc:spChg chg="add mod">
+          <ac:chgData name="Paul Ebbers" userId="68d1a23b9a453310" providerId="LiveId" clId="{7FC49E0B-4C39-4278-BA91-EF3C6B8D800A}" dt="2024-09-20T18:15:51.664" v="598" actId="1076"/>
+          <ac:spMkLst>
+            <pc:docMk/>
+            <pc:sldMk cId="3214827965" sldId="263"/>
+            <ac:spMk id="10" creationId="{8849A743-CE49-A9A3-BAD8-3B5B48786840}"/>
+          </ac:spMkLst>
+        </pc:spChg>
+        <pc:spChg chg="add mod">
+          <ac:chgData name="Paul Ebbers" userId="68d1a23b9a453310" providerId="LiveId" clId="{7FC49E0B-4C39-4278-BA91-EF3C6B8D800A}" dt="2024-09-20T18:12:22.778" v="477" actId="14100"/>
+          <ac:spMkLst>
+            <pc:docMk/>
+            <pc:sldMk cId="3214827965" sldId="263"/>
+            <ac:spMk id="11" creationId="{7D0E4ABC-16AC-30A1-E0A6-6F28CD8A0E36}"/>
+          </ac:spMkLst>
+        </pc:spChg>
+        <pc:spChg chg="add mod">
+          <ac:chgData name="Paul Ebbers" userId="68d1a23b9a453310" providerId="LiveId" clId="{7FC49E0B-4C39-4278-BA91-EF3C6B8D800A}" dt="2024-09-20T18:11:41.241" v="461" actId="1076"/>
+          <ac:spMkLst>
+            <pc:docMk/>
+            <pc:sldMk cId="3214827965" sldId="263"/>
+            <ac:spMk id="15" creationId="{D2A262BC-50FB-9E5A-C749-30D0C80D65BE}"/>
+          </ac:spMkLst>
+        </pc:spChg>
+        <pc:spChg chg="add mod">
+          <ac:chgData name="Paul Ebbers" userId="68d1a23b9a453310" providerId="LiveId" clId="{7FC49E0B-4C39-4278-BA91-EF3C6B8D800A}" dt="2024-09-20T18:13:03.465" v="483" actId="14100"/>
+          <ac:spMkLst>
+            <pc:docMk/>
+            <pc:sldMk cId="3214827965" sldId="263"/>
+            <ac:spMk id="19" creationId="{80F2365F-2700-38D1-FC6D-E82E66DF1A59}"/>
+          </ac:spMkLst>
+        </pc:spChg>
+        <pc:spChg chg="add mod">
+          <ac:chgData name="Paul Ebbers" userId="68d1a23b9a453310" providerId="LiveId" clId="{7FC49E0B-4C39-4278-BA91-EF3C6B8D800A}" dt="2024-09-20T18:13:57.125" v="525" actId="14100"/>
+          <ac:spMkLst>
+            <pc:docMk/>
+            <pc:sldMk cId="3214827965" sldId="263"/>
+            <ac:spMk id="23" creationId="{0EBF32B1-E4E5-AB8B-976F-FB81C7C16777}"/>
+          </ac:spMkLst>
+        </pc:spChg>
+        <pc:spChg chg="add mod">
+          <ac:chgData name="Paul Ebbers" userId="68d1a23b9a453310" providerId="LiveId" clId="{7FC49E0B-4C39-4278-BA91-EF3C6B8D800A}" dt="2024-09-20T18:15:07.242" v="594" actId="14100"/>
+          <ac:spMkLst>
+            <pc:docMk/>
+            <pc:sldMk cId="3214827965" sldId="263"/>
+            <ac:spMk id="25" creationId="{CD8A5B48-0E2A-EAAE-4B9F-C4FEAEB787C3}"/>
+          </ac:spMkLst>
+        </pc:spChg>
+        <pc:spChg chg="add mod">
+          <ac:chgData name="Paul Ebbers" userId="68d1a23b9a453310" providerId="LiveId" clId="{7FC49E0B-4C39-4278-BA91-EF3C6B8D800A}" dt="2024-09-20T18:14:22.361" v="533" actId="1076"/>
+          <ac:spMkLst>
+            <pc:docMk/>
+            <pc:sldMk cId="3214827965" sldId="263"/>
+            <ac:spMk id="29" creationId="{CA79FF97-A44B-40D6-753F-1FA8B5449B0C}"/>
+          </ac:spMkLst>
+        </pc:spChg>
+        <pc:spChg chg="add del mod">
+          <ac:chgData name="Paul Ebbers" userId="68d1a23b9a453310" providerId="LiveId" clId="{7FC49E0B-4C39-4278-BA91-EF3C6B8D800A}" dt="2024-09-20T18:14:04.607" v="529" actId="21"/>
+          <ac:spMkLst>
+            <pc:docMk/>
+            <pc:sldMk cId="3214827965" sldId="263"/>
+            <ac:spMk id="31" creationId="{FD24C9A1-F03A-1129-8E3D-8DA346EEFBE7}"/>
+          </ac:spMkLst>
+        </pc:spChg>
+        <pc:spChg chg="add mod">
+          <ac:chgData name="Paul Ebbers" userId="68d1a23b9a453310" providerId="LiveId" clId="{7FC49E0B-4C39-4278-BA91-EF3C6B8D800A}" dt="2024-09-20T18:14:32.206" v="535" actId="1076"/>
+          <ac:spMkLst>
+            <pc:docMk/>
+            <pc:sldMk cId="3214827965" sldId="263"/>
+            <ac:spMk id="32" creationId="{E7F6705C-A6BB-4AC5-9F47-88F3611E6307}"/>
+          </ac:spMkLst>
+        </pc:spChg>
+        <pc:spChg chg="add mod">
+          <ac:chgData name="Paul Ebbers" userId="68d1a23b9a453310" providerId="LiveId" clId="{7FC49E0B-4C39-4278-BA91-EF3C6B8D800A}" dt="2024-09-20T18:16:27.041" v="623" actId="20577"/>
+          <ac:spMkLst>
+            <pc:docMk/>
+            <pc:sldMk cId="3214827965" sldId="263"/>
+            <ac:spMk id="40" creationId="{A1C6EE6A-369A-8CF1-E08A-E71DB840FE2E}"/>
+          </ac:spMkLst>
+        </pc:spChg>
+        <pc:spChg chg="add mod">
+          <ac:chgData name="Paul Ebbers" userId="68d1a23b9a453310" providerId="LiveId" clId="{7FC49E0B-4C39-4278-BA91-EF3C6B8D800A}" dt="2024-09-20T18:17:07.261" v="671" actId="14100"/>
+          <ac:spMkLst>
+            <pc:docMk/>
+            <pc:sldMk cId="3214827965" sldId="263"/>
+            <ac:spMk id="45" creationId="{151FCCD5-C3B6-2C70-8C67-00664F1DE6A5}"/>
+          </ac:spMkLst>
+        </pc:spChg>
+        <pc:picChg chg="add del mod">
+          <ac:chgData name="Paul Ebbers" userId="68d1a23b9a453310" providerId="LiveId" clId="{7FC49E0B-4C39-4278-BA91-EF3C6B8D800A}" dt="2024-09-20T18:14:05.116" v="530" actId="1076"/>
+          <ac:picMkLst>
+            <pc:docMk/>
+            <pc:sldMk cId="3214827965" sldId="263"/>
+            <ac:picMk id="5" creationId="{F3DAC720-C3AF-E1F3-F67A-E44AC907C43A}"/>
+          </ac:picMkLst>
+        </pc:picChg>
+        <pc:cxnChg chg="add mod">
+          <ac:chgData name="Paul Ebbers" userId="68d1a23b9a453310" providerId="LiveId" clId="{7FC49E0B-4C39-4278-BA91-EF3C6B8D800A}" dt="2024-09-20T18:10:10.858" v="436" actId="14100"/>
+          <ac:cxnSpMkLst>
+            <pc:docMk/>
+            <pc:sldMk cId="3214827965" sldId="263"/>
+            <ac:cxnSpMk id="8" creationId="{5CF8DDBD-DE36-4B71-6E0F-951D40D0A5DC}"/>
+          </ac:cxnSpMkLst>
+        </pc:cxnChg>
+        <pc:cxnChg chg="add mod">
+          <ac:chgData name="Paul Ebbers" userId="68d1a23b9a453310" providerId="LiveId" clId="{7FC49E0B-4C39-4278-BA91-EF3C6B8D800A}" dt="2024-09-20T18:15:56.608" v="599" actId="14100"/>
+          <ac:cxnSpMkLst>
+            <pc:docMk/>
+            <pc:sldMk cId="3214827965" sldId="263"/>
+            <ac:cxnSpMk id="12" creationId="{7A50597E-E43E-0E01-8A60-BFEC80F0E591}"/>
+          </ac:cxnSpMkLst>
+        </pc:cxnChg>
+        <pc:cxnChg chg="add mod">
+          <ac:chgData name="Paul Ebbers" userId="68d1a23b9a453310" providerId="LiveId" clId="{7FC49E0B-4C39-4278-BA91-EF3C6B8D800A}" dt="2024-09-20T18:11:41.241" v="461" actId="1076"/>
+          <ac:cxnSpMkLst>
+            <pc:docMk/>
+            <pc:sldMk cId="3214827965" sldId="263"/>
+            <ac:cxnSpMk id="16" creationId="{6EDA2DFE-951C-605D-0765-C7EE71793E3B}"/>
+          </ac:cxnSpMkLst>
+        </pc:cxnChg>
+        <pc:cxnChg chg="add mod">
+          <ac:chgData name="Paul Ebbers" userId="68d1a23b9a453310" providerId="LiveId" clId="{7FC49E0B-4C39-4278-BA91-EF3C6B8D800A}" dt="2024-09-20T18:13:03.465" v="483" actId="14100"/>
+          <ac:cxnSpMkLst>
+            <pc:docMk/>
+            <pc:sldMk cId="3214827965" sldId="263"/>
+            <ac:cxnSpMk id="20" creationId="{D52C6726-B0FE-1352-AA96-C5D36351C53A}"/>
+          </ac:cxnSpMkLst>
+        </pc:cxnChg>
+        <pc:cxnChg chg="add mod">
+          <ac:chgData name="Paul Ebbers" userId="68d1a23b9a453310" providerId="LiveId" clId="{7FC49E0B-4C39-4278-BA91-EF3C6B8D800A}" dt="2024-09-20T18:15:14.793" v="596" actId="14100"/>
+          <ac:cxnSpMkLst>
+            <pc:docMk/>
+            <pc:sldMk cId="3214827965" sldId="263"/>
+            <ac:cxnSpMk id="26" creationId="{E4AE347F-7C21-EA9D-EF3F-507C1BA1FBB7}"/>
+          </ac:cxnSpMkLst>
+        </pc:cxnChg>
+        <pc:cxnChg chg="add mod">
+          <ac:chgData name="Paul Ebbers" userId="68d1a23b9a453310" providerId="LiveId" clId="{7FC49E0B-4C39-4278-BA91-EF3C6B8D800A}" dt="2024-09-20T18:14:40.437" v="537" actId="14100"/>
+          <ac:cxnSpMkLst>
+            <pc:docMk/>
+            <pc:sldMk cId="3214827965" sldId="263"/>
+            <ac:cxnSpMk id="33" creationId="{7BEE3392-FEA0-51F0-5FD8-40F705655C9E}"/>
+          </ac:cxnSpMkLst>
+        </pc:cxnChg>
+        <pc:cxnChg chg="add mod">
+          <ac:chgData name="Paul Ebbers" userId="68d1a23b9a453310" providerId="LiveId" clId="{7FC49E0B-4C39-4278-BA91-EF3C6B8D800A}" dt="2024-09-20T18:16:46.011" v="627" actId="14100"/>
+          <ac:cxnSpMkLst>
+            <pc:docMk/>
+            <pc:sldMk cId="3214827965" sldId="263"/>
+            <ac:cxnSpMk id="41" creationId="{9E69958B-36AF-52C3-C683-809DBB5734C4}"/>
+          </ac:cxnSpMkLst>
+        </pc:cxnChg>
+        <pc:cxnChg chg="add mod">
+          <ac:chgData name="Paul Ebbers" userId="68d1a23b9a453310" providerId="LiveId" clId="{7FC49E0B-4C39-4278-BA91-EF3C6B8D800A}" dt="2024-09-20T18:17:07.261" v="671" actId="14100"/>
+          <ac:cxnSpMkLst>
+            <pc:docMk/>
+            <pc:sldMk cId="3214827965" sldId="263"/>
+            <ac:cxnSpMk id="46" creationId="{197C9133-9132-02B2-D1DC-642DEDE9F995}"/>
+          </ac:cxnSpMkLst>
+        </pc:cxnChg>
+      </pc:sldChg>
+      <pc:sldChg chg="addSp delSp modSp new mod">
+        <pc:chgData name="Paul Ebbers" userId="68d1a23b9a453310" providerId="LiveId" clId="{7FC49E0B-4C39-4278-BA91-EF3C6B8D800A}" dt="2024-09-20T18:18:12.510" v="676" actId="962"/>
+        <pc:sldMkLst>
+          <pc:docMk/>
+          <pc:sldMk cId="3493196778" sldId="264"/>
+        </pc:sldMkLst>
+        <pc:spChg chg="del">
+          <ac:chgData name="Paul Ebbers" userId="68d1a23b9a453310" providerId="LiveId" clId="{7FC49E0B-4C39-4278-BA91-EF3C6B8D800A}" dt="2024-09-20T18:18:00.161" v="673" actId="478"/>
+          <ac:spMkLst>
+            <pc:docMk/>
+            <pc:sldMk cId="3493196778" sldId="264"/>
+            <ac:spMk id="2" creationId="{85CE6E45-183C-E5F2-6B52-C916EF833C4C}"/>
+          </ac:spMkLst>
+        </pc:spChg>
+        <pc:spChg chg="del">
+          <ac:chgData name="Paul Ebbers" userId="68d1a23b9a453310" providerId="LiveId" clId="{7FC49E0B-4C39-4278-BA91-EF3C6B8D800A}" dt="2024-09-20T18:18:11.540" v="674"/>
+          <ac:spMkLst>
+            <pc:docMk/>
+            <pc:sldMk cId="3493196778" sldId="264"/>
+            <ac:spMk id="3" creationId="{BB4A03B3-328B-BAE6-FCC6-902634412514}"/>
+          </ac:spMkLst>
+        </pc:spChg>
+        <pc:picChg chg="add mod">
+          <ac:chgData name="Paul Ebbers" userId="68d1a23b9a453310" providerId="LiveId" clId="{7FC49E0B-4C39-4278-BA91-EF3C6B8D800A}" dt="2024-09-20T18:18:12.510" v="676" actId="962"/>
+          <ac:picMkLst>
+            <pc:docMk/>
+            <pc:sldMk cId="3493196778" sldId="264"/>
+            <ac:picMk id="5" creationId="{1B0A1E32-CACF-A726-40FF-ECE8A88B079F}"/>
+          </ac:picMkLst>
+        </pc:picChg>
+      </pc:sldChg>
+    </pc:docChg>
+  </pc:docChgLst>
+</pc:chgInfo>
 </file>
 
 <file path=ppt/slideLayouts/slideLayout1.xml><?xml version="1.0" encoding="utf-8"?>
@@ -259,7 +1131,7 @@
           <a:p>
             <a:fld id="{224B6BFC-7D33-492C-B00A-5D9773C1146A}" type="datetimeFigureOut">
               <a:rPr lang="en-NL" smtClean="0"/>
-              <a:t>18/09/2024</a:t>
+              <a:t>20/09/2024</a:t>
             </a:fld>
             <a:endParaRPr lang="en-NL"/>
           </a:p>
@@ -459,7 +1331,7 @@
           <a:p>
             <a:fld id="{224B6BFC-7D33-492C-B00A-5D9773C1146A}" type="datetimeFigureOut">
               <a:rPr lang="en-NL" smtClean="0"/>
-              <a:t>18/09/2024</a:t>
+              <a:t>20/09/2024</a:t>
             </a:fld>
             <a:endParaRPr lang="en-NL"/>
           </a:p>
@@ -669,7 +1541,7 @@
           <a:p>
             <a:fld id="{224B6BFC-7D33-492C-B00A-5D9773C1146A}" type="datetimeFigureOut">
               <a:rPr lang="en-NL" smtClean="0"/>
-              <a:t>18/09/2024</a:t>
+              <a:t>20/09/2024</a:t>
             </a:fld>
             <a:endParaRPr lang="en-NL"/>
           </a:p>
@@ -869,7 +1741,7 @@
           <a:p>
             <a:fld id="{224B6BFC-7D33-492C-B00A-5D9773C1146A}" type="datetimeFigureOut">
               <a:rPr lang="en-NL" smtClean="0"/>
-              <a:t>18/09/2024</a:t>
+              <a:t>20/09/2024</a:t>
             </a:fld>
             <a:endParaRPr lang="en-NL"/>
           </a:p>
@@ -1145,7 +2017,7 @@
           <a:p>
             <a:fld id="{224B6BFC-7D33-492C-B00A-5D9773C1146A}" type="datetimeFigureOut">
               <a:rPr lang="en-NL" smtClean="0"/>
-              <a:t>18/09/2024</a:t>
+              <a:t>20/09/2024</a:t>
             </a:fld>
             <a:endParaRPr lang="en-NL"/>
           </a:p>
@@ -1413,7 +2285,7 @@
           <a:p>
             <a:fld id="{224B6BFC-7D33-492C-B00A-5D9773C1146A}" type="datetimeFigureOut">
               <a:rPr lang="en-NL" smtClean="0"/>
-              <a:t>18/09/2024</a:t>
+              <a:t>20/09/2024</a:t>
             </a:fld>
             <a:endParaRPr lang="en-NL"/>
           </a:p>
@@ -1828,7 +2700,7 @@
           <a:p>
             <a:fld id="{224B6BFC-7D33-492C-B00A-5D9773C1146A}" type="datetimeFigureOut">
               <a:rPr lang="en-NL" smtClean="0"/>
-              <a:t>18/09/2024</a:t>
+              <a:t>20/09/2024</a:t>
             </a:fld>
             <a:endParaRPr lang="en-NL"/>
           </a:p>
@@ -1970,7 +2842,7 @@
           <a:p>
             <a:fld id="{224B6BFC-7D33-492C-B00A-5D9773C1146A}" type="datetimeFigureOut">
               <a:rPr lang="en-NL" smtClean="0"/>
-              <a:t>18/09/2024</a:t>
+              <a:t>20/09/2024</a:t>
             </a:fld>
             <a:endParaRPr lang="en-NL"/>
           </a:p>
@@ -2083,7 +2955,7 @@
           <a:p>
             <a:fld id="{224B6BFC-7D33-492C-B00A-5D9773C1146A}" type="datetimeFigureOut">
               <a:rPr lang="en-NL" smtClean="0"/>
-              <a:t>18/09/2024</a:t>
+              <a:t>20/09/2024</a:t>
             </a:fld>
             <a:endParaRPr lang="en-NL"/>
           </a:p>
@@ -2396,7 +3268,7 @@
           <a:p>
             <a:fld id="{224B6BFC-7D33-492C-B00A-5D9773C1146A}" type="datetimeFigureOut">
               <a:rPr lang="en-NL" smtClean="0"/>
-              <a:t>18/09/2024</a:t>
+              <a:t>20/09/2024</a:t>
             </a:fld>
             <a:endParaRPr lang="en-NL"/>
           </a:p>
@@ -2685,7 +3557,7 @@
           <a:p>
             <a:fld id="{224B6BFC-7D33-492C-B00A-5D9773C1146A}" type="datetimeFigureOut">
               <a:rPr lang="en-NL" smtClean="0"/>
-              <a:t>18/09/2024</a:t>
+              <a:t>20/09/2024</a:t>
             </a:fld>
             <a:endParaRPr lang="en-NL"/>
           </a:p>
@@ -2928,7 +3800,7 @@
           <a:p>
             <a:fld id="{224B6BFC-7D33-492C-B00A-5D9773C1146A}" type="datetimeFigureOut">
               <a:rPr lang="en-NL" smtClean="0"/>
-              <a:t>18/09/2024</a:t>
+              <a:t>20/09/2024</a:t>
             </a:fld>
             <a:endParaRPr lang="en-NL"/>
           </a:p>
@@ -4060,8 +4932,8 @@
         </p:nvSpPr>
         <p:spPr>
           <a:xfrm>
-            <a:off x="1221018" y="2782795"/>
-            <a:ext cx="1558440" cy="246221"/>
+            <a:off x="839503" y="2730064"/>
+            <a:ext cx="1968809" cy="246221"/>
           </a:xfrm>
           <a:prstGeom prst="rect">
             <a:avLst/>
@@ -4076,7 +4948,7 @@
           <a:p>
             <a:r>
               <a:rPr lang="en-GB" sz="1000" dirty="0"/>
-              <a:t>Link to home page in wiki</a:t>
+              <a:t>Link to the home page in the wiki</a:t>
             </a:r>
             <a:endParaRPr lang="en-NL" sz="1000" dirty="0"/>
           </a:p>
@@ -4094,14 +4966,13 @@
           <p:cNvCxnSpPr>
             <a:cxnSpLocks/>
             <a:stCxn id="16" idx="3"/>
-            <a:endCxn id="5" idx="1"/>
           </p:cNvCxnSpPr>
           <p:nvPr/>
         </p:nvCxnSpPr>
         <p:spPr>
           <a:xfrm flipV="1">
-            <a:off x="2779458" y="2818096"/>
-            <a:ext cx="430094" cy="87810"/>
+            <a:off x="2808312" y="2762250"/>
+            <a:ext cx="468288" cy="90925"/>
           </a:xfrm>
           <a:prstGeom prst="straightConnector1">
             <a:avLst/>
@@ -4204,7 +5075,7 @@
         </p:nvSpPr>
         <p:spPr>
           <a:xfrm>
-            <a:off x="4997450" y="1295400"/>
+            <a:off x="5505581" y="1416050"/>
             <a:ext cx="596638" cy="246221"/>
           </a:xfrm>
           <a:prstGeom prst="rect">
@@ -4238,13 +5109,14 @@
           <p:cNvCxnSpPr>
             <a:cxnSpLocks/>
             <a:stCxn id="12" idx="2"/>
+            <a:endCxn id="2" idx="0"/>
           </p:cNvCxnSpPr>
           <p:nvPr/>
         </p:nvCxnSpPr>
         <p:spPr>
           <a:xfrm>
-            <a:off x="5295769" y="1541621"/>
-            <a:ext cx="666881" cy="528479"/>
+            <a:off x="5803900" y="1662271"/>
+            <a:ext cx="260284" cy="350837"/>
           </a:xfrm>
           <a:prstGeom prst="straightConnector1">
             <a:avLst/>
@@ -4414,6 +5286,110 @@
           <a:xfrm>
             <a:off x="5803900" y="5880100"/>
             <a:ext cx="1714500" cy="303213"/>
+          </a:xfrm>
+          <a:prstGeom prst="rect">
+            <a:avLst/>
+          </a:prstGeom>
+          <a:noFill/>
+          <a:ln>
+            <a:solidFill>
+              <a:srgbClr val="FF0000"/>
+            </a:solidFill>
+          </a:ln>
+        </p:spPr>
+        <p:style>
+          <a:lnRef idx="2">
+            <a:schemeClr val="accent1">
+              <a:shade val="15000"/>
+            </a:schemeClr>
+          </a:lnRef>
+          <a:fillRef idx="1">
+            <a:schemeClr val="accent1"/>
+          </a:fillRef>
+          <a:effectRef idx="0">
+            <a:schemeClr val="accent1"/>
+          </a:effectRef>
+          <a:fontRef idx="minor">
+            <a:schemeClr val="lt1"/>
+          </a:fontRef>
+        </p:style>
+        <p:txBody>
+          <a:bodyPr rtlCol="0" anchor="ctr"/>
+          <a:lstStyle/>
+          <a:p>
+            <a:pPr algn="ctr"/>
+            <a:endParaRPr lang="en-NL"/>
+          </a:p>
+        </p:txBody>
+      </p:sp>
+      <p:sp>
+        <p:nvSpPr>
+          <p:cNvPr id="2" name="Rectangle 1">
+            <a:extLst>
+              <a:ext uri="{FF2B5EF4-FFF2-40B4-BE49-F238E27FC236}">
+                <a16:creationId xmlns:a16="http://schemas.microsoft.com/office/drawing/2014/main" id="{C8FECB05-A4A0-1AD6-CF24-492952BD0B7F}"/>
+              </a:ext>
+            </a:extLst>
+          </p:cNvPr>
+          <p:cNvSpPr/>
+          <p:nvPr/>
+        </p:nvSpPr>
+        <p:spPr>
+          <a:xfrm>
+            <a:off x="4438518" y="2013108"/>
+            <a:ext cx="3251331" cy="303213"/>
+          </a:xfrm>
+          <a:prstGeom prst="rect">
+            <a:avLst/>
+          </a:prstGeom>
+          <a:noFill/>
+          <a:ln>
+            <a:solidFill>
+              <a:srgbClr val="FF0000"/>
+            </a:solidFill>
+          </a:ln>
+        </p:spPr>
+        <p:style>
+          <a:lnRef idx="2">
+            <a:schemeClr val="accent1">
+              <a:shade val="15000"/>
+            </a:schemeClr>
+          </a:lnRef>
+          <a:fillRef idx="1">
+            <a:schemeClr val="accent1"/>
+          </a:fillRef>
+          <a:effectRef idx="0">
+            <a:schemeClr val="accent1"/>
+          </a:effectRef>
+          <a:fontRef idx="minor">
+            <a:schemeClr val="lt1"/>
+          </a:fontRef>
+        </p:style>
+        <p:txBody>
+          <a:bodyPr rtlCol="0" anchor="ctr"/>
+          <a:lstStyle/>
+          <a:p>
+            <a:pPr algn="ctr"/>
+            <a:endParaRPr lang="en-NL"/>
+          </a:p>
+        </p:txBody>
+      </p:sp>
+      <p:sp>
+        <p:nvSpPr>
+          <p:cNvPr id="5" name="Rectangle 4">
+            <a:extLst>
+              <a:ext uri="{FF2B5EF4-FFF2-40B4-BE49-F238E27FC236}">
+                <a16:creationId xmlns:a16="http://schemas.microsoft.com/office/drawing/2014/main" id="{650A34A0-0A7A-A397-EA69-0391C5BD404E}"/>
+              </a:ext>
+            </a:extLst>
+          </p:cNvPr>
+          <p:cNvSpPr/>
+          <p:nvPr/>
+        </p:nvSpPr>
+        <p:spPr>
+          <a:xfrm>
+            <a:off x="7518400" y="5880100"/>
+            <a:ext cx="252519" cy="303213"/>
           </a:xfrm>
           <a:prstGeom prst="rect">
             <a:avLst/>
@@ -4517,84 +5493,6 @@
       </p:pic>
       <p:sp>
         <p:nvSpPr>
-          <p:cNvPr id="12" name="TextBox 11">
-            <a:extLst>
-              <a:ext uri="{FF2B5EF4-FFF2-40B4-BE49-F238E27FC236}">
-                <a16:creationId xmlns:a16="http://schemas.microsoft.com/office/drawing/2014/main" id="{3B506162-1E84-DA17-106E-C0FA03392AFF}"/>
-              </a:ext>
-            </a:extLst>
-          </p:cNvPr>
-          <p:cNvSpPr txBox="1"/>
-          <p:nvPr/>
-        </p:nvSpPr>
-        <p:spPr>
-          <a:xfrm>
-            <a:off x="4997450" y="1295400"/>
-            <a:ext cx="596638" cy="246221"/>
-          </a:xfrm>
-          <a:prstGeom prst="rect">
-            <a:avLst/>
-          </a:prstGeom>
-          <a:noFill/>
-        </p:spPr>
-        <p:txBody>
-          <a:bodyPr wrap="none" rtlCol="0">
-            <a:spAutoFit/>
-          </a:bodyPr>
-          <a:lstStyle/>
-          <a:p>
-            <a:r>
-              <a:rPr lang="en-GB" sz="1000" dirty="0"/>
-              <a:t>Tab bar</a:t>
-            </a:r>
-            <a:endParaRPr lang="en-NL" sz="1000" dirty="0"/>
-          </a:p>
-        </p:txBody>
-      </p:sp>
-      <p:cxnSp>
-        <p:nvCxnSpPr>
-          <p:cNvPr id="14" name="Straight Arrow Connector 13">
-            <a:extLst>
-              <a:ext uri="{FF2B5EF4-FFF2-40B4-BE49-F238E27FC236}">
-                <a16:creationId xmlns:a16="http://schemas.microsoft.com/office/drawing/2014/main" id="{DCBDFF8A-37E0-6944-114F-EFCA1973F9A2}"/>
-              </a:ext>
-            </a:extLst>
-          </p:cNvPr>
-          <p:cNvCxnSpPr>
-            <a:cxnSpLocks/>
-            <a:stCxn id="12" idx="2"/>
-          </p:cNvCxnSpPr>
-          <p:nvPr/>
-        </p:nvCxnSpPr>
-        <p:spPr>
-          <a:xfrm>
-            <a:off x="5295769" y="1541621"/>
-            <a:ext cx="666881" cy="528479"/>
-          </a:xfrm>
-          <a:prstGeom prst="straightConnector1">
-            <a:avLst/>
-          </a:prstGeom>
-          <a:ln>
-            <a:tailEnd type="triangle"/>
-          </a:ln>
-        </p:spPr>
-        <p:style>
-          <a:lnRef idx="2">
-            <a:schemeClr val="accent1"/>
-          </a:lnRef>
-          <a:fillRef idx="0">
-            <a:schemeClr val="accent1"/>
-          </a:fillRef>
-          <a:effectRef idx="1">
-            <a:schemeClr val="accent1"/>
-          </a:effectRef>
-          <a:fontRef idx="minor">
-            <a:schemeClr val="tx1"/>
-          </a:fontRef>
-        </p:style>
-      </p:cxnSp>
-      <p:sp>
-        <p:nvSpPr>
           <p:cNvPr id="17" name="Rectangle 16">
             <a:extLst>
               <a:ext uri="{FF2B5EF4-FFF2-40B4-BE49-F238E27FC236}">
@@ -4738,7 +5636,7 @@
         </p:nvSpPr>
         <p:spPr>
           <a:xfrm>
-            <a:off x="2520950" y="3571359"/>
+            <a:off x="2770676" y="3633629"/>
             <a:ext cx="1242523" cy="246221"/>
           </a:xfrm>
           <a:prstGeom prst="rect">
@@ -4777,8 +5675,8 @@
         </p:nvCxnSpPr>
         <p:spPr>
           <a:xfrm>
-            <a:off x="3763473" y="3694470"/>
-            <a:ext cx="764077" cy="60325"/>
+            <a:off x="4013199" y="3756740"/>
+            <a:ext cx="501651" cy="0"/>
           </a:xfrm>
           <a:prstGeom prst="straightConnector1">
             <a:avLst/>
@@ -4984,10 +5882,2749 @@
           </a:p>
         </p:txBody>
       </p:sp>
+      <p:sp>
+        <p:nvSpPr>
+          <p:cNvPr id="2" name="TextBox 1">
+            <a:extLst>
+              <a:ext uri="{FF2B5EF4-FFF2-40B4-BE49-F238E27FC236}">
+                <a16:creationId xmlns:a16="http://schemas.microsoft.com/office/drawing/2014/main" id="{5047E04E-F333-AD73-A3A0-B33344EF4F42}"/>
+              </a:ext>
+            </a:extLst>
+          </p:cNvPr>
+          <p:cNvSpPr txBox="1"/>
+          <p:nvPr/>
+        </p:nvSpPr>
+        <p:spPr>
+          <a:xfrm>
+            <a:off x="2698750" y="4206166"/>
+            <a:ext cx="1450976" cy="400110"/>
+          </a:xfrm>
+          <a:prstGeom prst="rect">
+            <a:avLst/>
+          </a:prstGeom>
+          <a:noFill/>
+        </p:spPr>
+        <p:txBody>
+          <a:bodyPr wrap="square" rtlCol="0">
+            <a:spAutoFit/>
+          </a:bodyPr>
+          <a:lstStyle/>
+          <a:p>
+            <a:r>
+              <a:rPr lang="en-GB" sz="1000" dirty="0"/>
+              <a:t>Add or remove  the selected command(s)</a:t>
+            </a:r>
+            <a:endParaRPr lang="en-NL" sz="1000" dirty="0"/>
+          </a:p>
+        </p:txBody>
+      </p:sp>
+      <p:cxnSp>
+        <p:nvCxnSpPr>
+          <p:cNvPr id="3" name="Straight Arrow Connector 2">
+            <a:extLst>
+              <a:ext uri="{FF2B5EF4-FFF2-40B4-BE49-F238E27FC236}">
+                <a16:creationId xmlns:a16="http://schemas.microsoft.com/office/drawing/2014/main" id="{2ED95897-6E64-CD37-DA42-E6CB37920566}"/>
+              </a:ext>
+            </a:extLst>
+          </p:cNvPr>
+          <p:cNvCxnSpPr>
+            <a:cxnSpLocks/>
+            <a:stCxn id="2" idx="3"/>
+          </p:cNvCxnSpPr>
+          <p:nvPr/>
+        </p:nvCxnSpPr>
+        <p:spPr>
+          <a:xfrm flipV="1">
+            <a:off x="4149726" y="4180488"/>
+            <a:ext cx="1812924" cy="225733"/>
+          </a:xfrm>
+          <a:prstGeom prst="straightConnector1">
+            <a:avLst/>
+          </a:prstGeom>
+          <a:ln>
+            <a:tailEnd type="triangle"/>
+          </a:ln>
+        </p:spPr>
+        <p:style>
+          <a:lnRef idx="2">
+            <a:schemeClr val="accent1"/>
+          </a:lnRef>
+          <a:fillRef idx="0">
+            <a:schemeClr val="accent1"/>
+          </a:fillRef>
+          <a:effectRef idx="1">
+            <a:schemeClr val="accent1"/>
+          </a:effectRef>
+          <a:fontRef idx="minor">
+            <a:schemeClr val="tx1"/>
+          </a:fontRef>
+        </p:style>
+      </p:cxnSp>
+      <p:sp>
+        <p:nvSpPr>
+          <p:cNvPr id="4" name="TextBox 3">
+            <a:extLst>
+              <a:ext uri="{FF2B5EF4-FFF2-40B4-BE49-F238E27FC236}">
+                <a16:creationId xmlns:a16="http://schemas.microsoft.com/office/drawing/2014/main" id="{EE2C8A8D-3255-430D-058B-F36729E4F91F}"/>
+              </a:ext>
+            </a:extLst>
+          </p:cNvPr>
+          <p:cNvSpPr txBox="1"/>
+          <p:nvPr/>
+        </p:nvSpPr>
+        <p:spPr>
+          <a:xfrm>
+            <a:off x="8178800" y="4406221"/>
+            <a:ext cx="1495426" cy="400110"/>
+          </a:xfrm>
+          <a:prstGeom prst="rect">
+            <a:avLst/>
+          </a:prstGeom>
+          <a:noFill/>
+        </p:spPr>
+        <p:txBody>
+          <a:bodyPr wrap="square" rtlCol="0">
+            <a:spAutoFit/>
+          </a:bodyPr>
+          <a:lstStyle/>
+          <a:p>
+            <a:r>
+              <a:rPr lang="en-GB" sz="1000" dirty="0"/>
+              <a:t>Move selected command up or down</a:t>
+            </a:r>
+            <a:endParaRPr lang="en-NL" sz="1000" dirty="0"/>
+          </a:p>
+        </p:txBody>
+      </p:sp>
+      <p:cxnSp>
+        <p:nvCxnSpPr>
+          <p:cNvPr id="5" name="Straight Arrow Connector 4">
+            <a:extLst>
+              <a:ext uri="{FF2B5EF4-FFF2-40B4-BE49-F238E27FC236}">
+                <a16:creationId xmlns:a16="http://schemas.microsoft.com/office/drawing/2014/main" id="{522D386F-00F7-840C-CB5D-4F30E1509A3A}"/>
+              </a:ext>
+            </a:extLst>
+          </p:cNvPr>
+          <p:cNvCxnSpPr>
+            <a:cxnSpLocks/>
+            <a:stCxn id="4" idx="1"/>
+          </p:cNvCxnSpPr>
+          <p:nvPr/>
+        </p:nvCxnSpPr>
+        <p:spPr>
+          <a:xfrm flipH="1">
+            <a:off x="6305550" y="4606276"/>
+            <a:ext cx="1873250" cy="0"/>
+          </a:xfrm>
+          <a:prstGeom prst="straightConnector1">
+            <a:avLst/>
+          </a:prstGeom>
+          <a:ln>
+            <a:tailEnd type="triangle"/>
+          </a:ln>
+        </p:spPr>
+        <p:style>
+          <a:lnRef idx="2">
+            <a:schemeClr val="accent1"/>
+          </a:lnRef>
+          <a:fillRef idx="0">
+            <a:schemeClr val="accent1"/>
+          </a:fillRef>
+          <a:effectRef idx="1">
+            <a:schemeClr val="accent1"/>
+          </a:effectRef>
+          <a:fontRef idx="minor">
+            <a:schemeClr val="tx1"/>
+          </a:fontRef>
+        </p:style>
+      </p:cxnSp>
     </p:spTree>
     <p:extLst>
       <p:ext uri="{BB962C8B-B14F-4D97-AF65-F5344CB8AC3E}">
         <p14:creationId xmlns:p14="http://schemas.microsoft.com/office/powerpoint/2010/main" val="3715892363"/>
+      </p:ext>
+    </p:extLst>
+  </p:cSld>
+  <p:clrMapOvr>
+    <a:masterClrMapping/>
+  </p:clrMapOvr>
+</p:sld>
+</file>
+
+<file path=ppt/slides/slide5.xml><?xml version="1.0" encoding="utf-8"?>
+<p:sld xmlns:a="http://schemas.openxmlformats.org/drawingml/2006/main" xmlns:r="http://schemas.openxmlformats.org/officeDocument/2006/relationships" xmlns:p="http://schemas.openxmlformats.org/presentationml/2006/main">
+  <p:cSld>
+    <p:spTree>
+      <p:nvGrpSpPr>
+        <p:cNvPr id="1" name=""/>
+        <p:cNvGrpSpPr/>
+        <p:nvPr/>
+      </p:nvGrpSpPr>
+      <p:grpSpPr>
+        <a:xfrm>
+          <a:off x="0" y="0"/>
+          <a:ext cx="0" cy="0"/>
+          <a:chOff x="0" y="0"/>
+          <a:chExt cx="0" cy="0"/>
+        </a:xfrm>
+      </p:grpSpPr>
+      <p:pic>
+        <p:nvPicPr>
+          <p:cNvPr id="19" name="Content Placeholder 18" descr="A screenshot of a computer&#10;&#10;Description automatically generated">
+            <a:extLst>
+              <a:ext uri="{FF2B5EF4-FFF2-40B4-BE49-F238E27FC236}">
+                <a16:creationId xmlns:a16="http://schemas.microsoft.com/office/drawing/2014/main" id="{CFA3CEE3-8EAC-3FDC-52D5-95429C8624B5}"/>
+              </a:ext>
+            </a:extLst>
+          </p:cNvPr>
+          <p:cNvPicPr>
+            <a:picLocks noGrp="1" noChangeAspect="1"/>
+          </p:cNvPicPr>
+          <p:nvPr>
+            <p:ph idx="1"/>
+          </p:nvPr>
+        </p:nvPicPr>
+        <p:blipFill>
+          <a:blip r:embed="rId2">
+            <a:extLst>
+              <a:ext uri="{28A0092B-C50C-407E-A947-70E740481C1C}">
+                <a14:useLocalDpi xmlns:a14="http://schemas.microsoft.com/office/drawing/2010/main" val="0"/>
+              </a:ext>
+            </a:extLst>
+          </a:blip>
+          <a:stretch>
+            <a:fillRect/>
+          </a:stretch>
+        </p:blipFill>
+        <p:spPr>
+          <a:xfrm>
+            <a:off x="4421080" y="1825625"/>
+            <a:ext cx="3349839" cy="4351338"/>
+          </a:xfrm>
+        </p:spPr>
+      </p:pic>
+      <p:sp>
+        <p:nvSpPr>
+          <p:cNvPr id="6" name="Rectangle 5">
+            <a:extLst>
+              <a:ext uri="{FF2B5EF4-FFF2-40B4-BE49-F238E27FC236}">
+                <a16:creationId xmlns:a16="http://schemas.microsoft.com/office/drawing/2014/main" id="{B2589098-2DC0-9FA1-419E-5B5FC44A0B65}"/>
+              </a:ext>
+            </a:extLst>
+          </p:cNvPr>
+          <p:cNvSpPr/>
+          <p:nvPr/>
+        </p:nvSpPr>
+        <p:spPr>
+          <a:xfrm>
+            <a:off x="4349750" y="2247900"/>
+            <a:ext cx="3467100" cy="450850"/>
+          </a:xfrm>
+          <a:prstGeom prst="rect">
+            <a:avLst/>
+          </a:prstGeom>
+          <a:noFill/>
+          <a:ln>
+            <a:solidFill>
+              <a:srgbClr val="FF0000"/>
+            </a:solidFill>
+          </a:ln>
+        </p:spPr>
+        <p:style>
+          <a:lnRef idx="2">
+            <a:schemeClr val="accent1">
+              <a:shade val="15000"/>
+            </a:schemeClr>
+          </a:lnRef>
+          <a:fillRef idx="1">
+            <a:schemeClr val="accent1"/>
+          </a:fillRef>
+          <a:effectRef idx="0">
+            <a:schemeClr val="accent1"/>
+          </a:effectRef>
+          <a:fontRef idx="minor">
+            <a:schemeClr val="lt1"/>
+          </a:fontRef>
+        </p:style>
+        <p:txBody>
+          <a:bodyPr rtlCol="0" anchor="ctr"/>
+          <a:lstStyle/>
+          <a:p>
+            <a:pPr algn="ctr"/>
+            <a:endParaRPr lang="en-NL"/>
+          </a:p>
+        </p:txBody>
+      </p:sp>
+      <p:sp>
+        <p:nvSpPr>
+          <p:cNvPr id="7" name="TextBox 6">
+            <a:extLst>
+              <a:ext uri="{FF2B5EF4-FFF2-40B4-BE49-F238E27FC236}">
+                <a16:creationId xmlns:a16="http://schemas.microsoft.com/office/drawing/2014/main" id="{AC1B5CB3-9EDF-B367-FC60-329CF720C344}"/>
+              </a:ext>
+            </a:extLst>
+          </p:cNvPr>
+          <p:cNvSpPr txBox="1"/>
+          <p:nvPr/>
+        </p:nvSpPr>
+        <p:spPr>
+          <a:xfrm>
+            <a:off x="2828543" y="2288659"/>
+            <a:ext cx="904415" cy="246221"/>
+          </a:xfrm>
+          <a:prstGeom prst="rect">
+            <a:avLst/>
+          </a:prstGeom>
+          <a:noFill/>
+        </p:spPr>
+        <p:txBody>
+          <a:bodyPr wrap="none" rtlCol="0">
+            <a:spAutoFit/>
+          </a:bodyPr>
+          <a:lstStyle/>
+          <a:p>
+            <a:r>
+              <a:rPr lang="en-GB" sz="1000" dirty="0"/>
+              <a:t>Filter section</a:t>
+            </a:r>
+            <a:endParaRPr lang="en-NL" sz="1000" dirty="0"/>
+          </a:p>
+        </p:txBody>
+      </p:sp>
+      <p:cxnSp>
+        <p:nvCxnSpPr>
+          <p:cNvPr id="8" name="Straight Arrow Connector 7">
+            <a:extLst>
+              <a:ext uri="{FF2B5EF4-FFF2-40B4-BE49-F238E27FC236}">
+                <a16:creationId xmlns:a16="http://schemas.microsoft.com/office/drawing/2014/main" id="{0924C449-A7E7-6028-4674-D312ED7041E1}"/>
+              </a:ext>
+            </a:extLst>
+          </p:cNvPr>
+          <p:cNvCxnSpPr>
+            <a:cxnSpLocks/>
+            <a:stCxn id="7" idx="3"/>
+            <a:endCxn id="6" idx="1"/>
+          </p:cNvCxnSpPr>
+          <p:nvPr/>
+        </p:nvCxnSpPr>
+        <p:spPr>
+          <a:xfrm>
+            <a:off x="3732958" y="2411770"/>
+            <a:ext cx="616792" cy="61555"/>
+          </a:xfrm>
+          <a:prstGeom prst="straightConnector1">
+            <a:avLst/>
+          </a:prstGeom>
+          <a:ln>
+            <a:tailEnd type="triangle"/>
+          </a:ln>
+        </p:spPr>
+        <p:style>
+          <a:lnRef idx="2">
+            <a:schemeClr val="accent1"/>
+          </a:lnRef>
+          <a:fillRef idx="0">
+            <a:schemeClr val="accent1"/>
+          </a:fillRef>
+          <a:effectRef idx="1">
+            <a:schemeClr val="accent1"/>
+          </a:effectRef>
+          <a:fontRef idx="minor">
+            <a:schemeClr val="tx1"/>
+          </a:fontRef>
+        </p:style>
+      </p:cxnSp>
+      <p:sp>
+        <p:nvSpPr>
+          <p:cNvPr id="9" name="TextBox 8">
+            <a:extLst>
+              <a:ext uri="{FF2B5EF4-FFF2-40B4-BE49-F238E27FC236}">
+                <a16:creationId xmlns:a16="http://schemas.microsoft.com/office/drawing/2014/main" id="{96A845B6-F3AD-44C2-8FF7-1B15840A93A1}"/>
+              </a:ext>
+            </a:extLst>
+          </p:cNvPr>
+          <p:cNvSpPr txBox="1"/>
+          <p:nvPr/>
+        </p:nvSpPr>
+        <p:spPr>
+          <a:xfrm>
+            <a:off x="2520950" y="3571359"/>
+            <a:ext cx="1242523" cy="246221"/>
+          </a:xfrm>
+          <a:prstGeom prst="rect">
+            <a:avLst/>
+          </a:prstGeom>
+          <a:noFill/>
+        </p:spPr>
+        <p:txBody>
+          <a:bodyPr wrap="square" rtlCol="0">
+            <a:spAutoFit/>
+          </a:bodyPr>
+          <a:lstStyle/>
+          <a:p>
+            <a:r>
+              <a:rPr lang="en-GB" sz="1000" dirty="0"/>
+              <a:t>Commands to add</a:t>
+            </a:r>
+            <a:endParaRPr lang="en-NL" sz="1000" dirty="0"/>
+          </a:p>
+        </p:txBody>
+      </p:sp>
+      <p:cxnSp>
+        <p:nvCxnSpPr>
+          <p:cNvPr id="10" name="Straight Arrow Connector 9">
+            <a:extLst>
+              <a:ext uri="{FF2B5EF4-FFF2-40B4-BE49-F238E27FC236}">
+                <a16:creationId xmlns:a16="http://schemas.microsoft.com/office/drawing/2014/main" id="{177555F3-26FC-2244-2FDC-E94AC7849A8B}"/>
+              </a:ext>
+            </a:extLst>
+          </p:cNvPr>
+          <p:cNvCxnSpPr>
+            <a:cxnSpLocks/>
+            <a:stCxn id="9" idx="3"/>
+          </p:cNvCxnSpPr>
+          <p:nvPr/>
+        </p:nvCxnSpPr>
+        <p:spPr>
+          <a:xfrm>
+            <a:off x="3763473" y="3694470"/>
+            <a:ext cx="764077" cy="60325"/>
+          </a:xfrm>
+          <a:prstGeom prst="straightConnector1">
+            <a:avLst/>
+          </a:prstGeom>
+          <a:ln>
+            <a:tailEnd type="triangle"/>
+          </a:ln>
+        </p:spPr>
+        <p:style>
+          <a:lnRef idx="2">
+            <a:schemeClr val="accent1"/>
+          </a:lnRef>
+          <a:fillRef idx="0">
+            <a:schemeClr val="accent1"/>
+          </a:fillRef>
+          <a:effectRef idx="1">
+            <a:schemeClr val="accent1"/>
+          </a:effectRef>
+          <a:fontRef idx="minor">
+            <a:schemeClr val="tx1"/>
+          </a:fontRef>
+        </p:style>
+      </p:cxnSp>
+      <p:sp>
+        <p:nvSpPr>
+          <p:cNvPr id="11" name="TextBox 10">
+            <a:extLst>
+              <a:ext uri="{FF2B5EF4-FFF2-40B4-BE49-F238E27FC236}">
+                <a16:creationId xmlns:a16="http://schemas.microsoft.com/office/drawing/2014/main" id="{F4F16CBA-09AB-761D-BC23-30916641E91F}"/>
+              </a:ext>
+            </a:extLst>
+          </p:cNvPr>
+          <p:cNvSpPr txBox="1"/>
+          <p:nvPr/>
+        </p:nvSpPr>
+        <p:spPr>
+          <a:xfrm>
+            <a:off x="8178800" y="3510519"/>
+            <a:ext cx="1242523" cy="246221"/>
+          </a:xfrm>
+          <a:prstGeom prst="rect">
+            <a:avLst/>
+          </a:prstGeom>
+          <a:noFill/>
+        </p:spPr>
+        <p:txBody>
+          <a:bodyPr wrap="square" rtlCol="0">
+            <a:spAutoFit/>
+          </a:bodyPr>
+          <a:lstStyle/>
+          <a:p>
+            <a:r>
+              <a:rPr lang="en-GB" sz="1000" dirty="0"/>
+              <a:t>Added commands </a:t>
+            </a:r>
+            <a:endParaRPr lang="en-NL" sz="1000" dirty="0"/>
+          </a:p>
+        </p:txBody>
+      </p:sp>
+      <p:cxnSp>
+        <p:nvCxnSpPr>
+          <p:cNvPr id="12" name="Straight Arrow Connector 11">
+            <a:extLst>
+              <a:ext uri="{FF2B5EF4-FFF2-40B4-BE49-F238E27FC236}">
+                <a16:creationId xmlns:a16="http://schemas.microsoft.com/office/drawing/2014/main" id="{CF3D3301-5FC8-AAB7-EAE2-D304946D3274}"/>
+              </a:ext>
+            </a:extLst>
+          </p:cNvPr>
+          <p:cNvCxnSpPr>
+            <a:cxnSpLocks/>
+            <a:stCxn id="11" idx="1"/>
+          </p:cNvCxnSpPr>
+          <p:nvPr/>
+        </p:nvCxnSpPr>
+        <p:spPr>
+          <a:xfrm flipH="1">
+            <a:off x="7258050" y="3633630"/>
+            <a:ext cx="920750" cy="60839"/>
+          </a:xfrm>
+          <a:prstGeom prst="straightConnector1">
+            <a:avLst/>
+          </a:prstGeom>
+          <a:ln>
+            <a:tailEnd type="triangle"/>
+          </a:ln>
+        </p:spPr>
+        <p:style>
+          <a:lnRef idx="2">
+            <a:schemeClr val="accent1"/>
+          </a:lnRef>
+          <a:fillRef idx="0">
+            <a:schemeClr val="accent1"/>
+          </a:fillRef>
+          <a:effectRef idx="1">
+            <a:schemeClr val="accent1"/>
+          </a:effectRef>
+          <a:fontRef idx="minor">
+            <a:schemeClr val="tx1"/>
+          </a:fontRef>
+        </p:style>
+      </p:cxnSp>
+      <p:sp>
+        <p:nvSpPr>
+          <p:cNvPr id="13" name="Rectangle 12">
+            <a:extLst>
+              <a:ext uri="{FF2B5EF4-FFF2-40B4-BE49-F238E27FC236}">
+                <a16:creationId xmlns:a16="http://schemas.microsoft.com/office/drawing/2014/main" id="{07B75523-DDD6-CB6C-C896-FC4C74AECAF4}"/>
+              </a:ext>
+            </a:extLst>
+          </p:cNvPr>
+          <p:cNvSpPr/>
+          <p:nvPr/>
+        </p:nvSpPr>
+        <p:spPr>
+          <a:xfrm>
+            <a:off x="5972175" y="4159251"/>
+            <a:ext cx="222250" cy="349250"/>
+          </a:xfrm>
+          <a:prstGeom prst="rect">
+            <a:avLst/>
+          </a:prstGeom>
+          <a:noFill/>
+          <a:ln>
+            <a:solidFill>
+              <a:srgbClr val="FF0000"/>
+            </a:solidFill>
+          </a:ln>
+        </p:spPr>
+        <p:style>
+          <a:lnRef idx="2">
+            <a:schemeClr val="accent1">
+              <a:shade val="15000"/>
+            </a:schemeClr>
+          </a:lnRef>
+          <a:fillRef idx="1">
+            <a:schemeClr val="accent1"/>
+          </a:fillRef>
+          <a:effectRef idx="0">
+            <a:schemeClr val="accent1"/>
+          </a:effectRef>
+          <a:fontRef idx="minor">
+            <a:schemeClr val="lt1"/>
+          </a:fontRef>
+        </p:style>
+        <p:txBody>
+          <a:bodyPr rtlCol="0" anchor="ctr"/>
+          <a:lstStyle/>
+          <a:p>
+            <a:pPr algn="ctr"/>
+            <a:endParaRPr lang="en-NL"/>
+          </a:p>
+        </p:txBody>
+      </p:sp>
+    </p:spTree>
+    <p:extLst>
+      <p:ext uri="{BB962C8B-B14F-4D97-AF65-F5344CB8AC3E}">
+        <p14:creationId xmlns:p14="http://schemas.microsoft.com/office/powerpoint/2010/main" val="637275875"/>
+      </p:ext>
+    </p:extLst>
+  </p:cSld>
+  <p:clrMapOvr>
+    <a:masterClrMapping/>
+  </p:clrMapOvr>
+</p:sld>
+</file>
+
+<file path=ppt/slides/slide6.xml><?xml version="1.0" encoding="utf-8"?>
+<p:sld xmlns:a="http://schemas.openxmlformats.org/drawingml/2006/main" xmlns:r="http://schemas.openxmlformats.org/officeDocument/2006/relationships" xmlns:p="http://schemas.openxmlformats.org/presentationml/2006/main">
+  <p:cSld>
+    <p:spTree>
+      <p:nvGrpSpPr>
+        <p:cNvPr id="1" name=""/>
+        <p:cNvGrpSpPr/>
+        <p:nvPr/>
+      </p:nvGrpSpPr>
+      <p:grpSpPr>
+        <a:xfrm>
+          <a:off x="0" y="0"/>
+          <a:ext cx="0" cy="0"/>
+          <a:chOff x="0" y="0"/>
+          <a:chExt cx="0" cy="0"/>
+        </a:xfrm>
+      </p:grpSpPr>
+      <p:pic>
+        <p:nvPicPr>
+          <p:cNvPr id="5" name="Content Placeholder 4" descr="A screenshot of a computer program&#10;&#10;Description automatically generated">
+            <a:extLst>
+              <a:ext uri="{FF2B5EF4-FFF2-40B4-BE49-F238E27FC236}">
+                <a16:creationId xmlns:a16="http://schemas.microsoft.com/office/drawing/2014/main" id="{6C4883BE-756B-0A1D-B24E-14CBB7ECF390}"/>
+              </a:ext>
+            </a:extLst>
+          </p:cNvPr>
+          <p:cNvPicPr>
+            <a:picLocks noGrp="1" noChangeAspect="1"/>
+          </p:cNvPicPr>
+          <p:nvPr>
+            <p:ph idx="1"/>
+          </p:nvPr>
+        </p:nvPicPr>
+        <p:blipFill>
+          <a:blip r:embed="rId2">
+            <a:extLst>
+              <a:ext uri="{28A0092B-C50C-407E-A947-70E740481C1C}">
+                <a14:useLocalDpi xmlns:a14="http://schemas.microsoft.com/office/drawing/2010/main" val="0"/>
+              </a:ext>
+            </a:extLst>
+          </a:blip>
+          <a:stretch>
+            <a:fillRect/>
+          </a:stretch>
+        </p:blipFill>
+        <p:spPr>
+          <a:xfrm>
+            <a:off x="4421080" y="1983582"/>
+            <a:ext cx="3349839" cy="4351338"/>
+          </a:xfrm>
+        </p:spPr>
+      </p:pic>
+      <p:sp>
+        <p:nvSpPr>
+          <p:cNvPr id="9" name="TextBox 8">
+            <a:extLst>
+              <a:ext uri="{FF2B5EF4-FFF2-40B4-BE49-F238E27FC236}">
+                <a16:creationId xmlns:a16="http://schemas.microsoft.com/office/drawing/2014/main" id="{536B246E-F5AD-10E2-38D0-76F6CDC2F4D9}"/>
+              </a:ext>
+            </a:extLst>
+          </p:cNvPr>
+          <p:cNvSpPr txBox="1"/>
+          <p:nvPr/>
+        </p:nvSpPr>
+        <p:spPr>
+          <a:xfrm>
+            <a:off x="2438400" y="3571359"/>
+            <a:ext cx="1325073" cy="246221"/>
+          </a:xfrm>
+          <a:prstGeom prst="rect">
+            <a:avLst/>
+          </a:prstGeom>
+          <a:noFill/>
+        </p:spPr>
+        <p:txBody>
+          <a:bodyPr wrap="square" rtlCol="0">
+            <a:spAutoFit/>
+          </a:bodyPr>
+          <a:lstStyle/>
+          <a:p>
+            <a:r>
+              <a:rPr lang="en-GB" sz="1000" dirty="0"/>
+              <a:t>Workbenches to add</a:t>
+            </a:r>
+            <a:endParaRPr lang="en-NL" sz="1000" dirty="0"/>
+          </a:p>
+        </p:txBody>
+      </p:sp>
+      <p:cxnSp>
+        <p:nvCxnSpPr>
+          <p:cNvPr id="10" name="Straight Arrow Connector 9">
+            <a:extLst>
+              <a:ext uri="{FF2B5EF4-FFF2-40B4-BE49-F238E27FC236}">
+                <a16:creationId xmlns:a16="http://schemas.microsoft.com/office/drawing/2014/main" id="{4E362287-F2EC-6DB8-839A-EC9F3890F022}"/>
+              </a:ext>
+            </a:extLst>
+          </p:cNvPr>
+          <p:cNvCxnSpPr>
+            <a:cxnSpLocks/>
+            <a:stCxn id="9" idx="3"/>
+          </p:cNvCxnSpPr>
+          <p:nvPr/>
+        </p:nvCxnSpPr>
+        <p:spPr>
+          <a:xfrm>
+            <a:off x="3763473" y="3694470"/>
+            <a:ext cx="764077" cy="60325"/>
+          </a:xfrm>
+          <a:prstGeom prst="straightConnector1">
+            <a:avLst/>
+          </a:prstGeom>
+          <a:ln>
+            <a:tailEnd type="triangle"/>
+          </a:ln>
+        </p:spPr>
+        <p:style>
+          <a:lnRef idx="2">
+            <a:schemeClr val="accent1"/>
+          </a:lnRef>
+          <a:fillRef idx="0">
+            <a:schemeClr val="accent1"/>
+          </a:fillRef>
+          <a:effectRef idx="1">
+            <a:schemeClr val="accent1"/>
+          </a:effectRef>
+          <a:fontRef idx="minor">
+            <a:schemeClr val="tx1"/>
+          </a:fontRef>
+        </p:style>
+      </p:cxnSp>
+      <p:sp>
+        <p:nvSpPr>
+          <p:cNvPr id="11" name="TextBox 10">
+            <a:extLst>
+              <a:ext uri="{FF2B5EF4-FFF2-40B4-BE49-F238E27FC236}">
+                <a16:creationId xmlns:a16="http://schemas.microsoft.com/office/drawing/2014/main" id="{F9BDD7EF-CC7A-A3D0-C594-08B12B549162}"/>
+              </a:ext>
+            </a:extLst>
+          </p:cNvPr>
+          <p:cNvSpPr txBox="1"/>
+          <p:nvPr/>
+        </p:nvSpPr>
+        <p:spPr>
+          <a:xfrm>
+            <a:off x="8178800" y="3510519"/>
+            <a:ext cx="1397000" cy="246221"/>
+          </a:xfrm>
+          <a:prstGeom prst="rect">
+            <a:avLst/>
+          </a:prstGeom>
+          <a:noFill/>
+        </p:spPr>
+        <p:txBody>
+          <a:bodyPr wrap="square" rtlCol="0">
+            <a:spAutoFit/>
+          </a:bodyPr>
+          <a:lstStyle/>
+          <a:p>
+            <a:r>
+              <a:rPr lang="en-GB" sz="1000" dirty="0"/>
+              <a:t>Added workbenches </a:t>
+            </a:r>
+            <a:endParaRPr lang="en-NL" sz="1000" dirty="0"/>
+          </a:p>
+        </p:txBody>
+      </p:sp>
+      <p:cxnSp>
+        <p:nvCxnSpPr>
+          <p:cNvPr id="12" name="Straight Arrow Connector 11">
+            <a:extLst>
+              <a:ext uri="{FF2B5EF4-FFF2-40B4-BE49-F238E27FC236}">
+                <a16:creationId xmlns:a16="http://schemas.microsoft.com/office/drawing/2014/main" id="{4ADEE961-F8B4-4D73-F19E-450B9FC458A0}"/>
+              </a:ext>
+            </a:extLst>
+          </p:cNvPr>
+          <p:cNvCxnSpPr>
+            <a:cxnSpLocks/>
+            <a:stCxn id="11" idx="1"/>
+          </p:cNvCxnSpPr>
+          <p:nvPr/>
+        </p:nvCxnSpPr>
+        <p:spPr>
+          <a:xfrm flipH="1">
+            <a:off x="7258050" y="3633630"/>
+            <a:ext cx="920750" cy="60839"/>
+          </a:xfrm>
+          <a:prstGeom prst="straightConnector1">
+            <a:avLst/>
+          </a:prstGeom>
+          <a:ln>
+            <a:tailEnd type="triangle"/>
+          </a:ln>
+        </p:spPr>
+        <p:style>
+          <a:lnRef idx="2">
+            <a:schemeClr val="accent1"/>
+          </a:lnRef>
+          <a:fillRef idx="0">
+            <a:schemeClr val="accent1"/>
+          </a:fillRef>
+          <a:effectRef idx="1">
+            <a:schemeClr val="accent1"/>
+          </a:effectRef>
+          <a:fontRef idx="minor">
+            <a:schemeClr val="tx1"/>
+          </a:fontRef>
+        </p:style>
+      </p:cxnSp>
+      <p:sp>
+        <p:nvSpPr>
+          <p:cNvPr id="13" name="Rectangle 12">
+            <a:extLst>
+              <a:ext uri="{FF2B5EF4-FFF2-40B4-BE49-F238E27FC236}">
+                <a16:creationId xmlns:a16="http://schemas.microsoft.com/office/drawing/2014/main" id="{AF1BCEA3-2371-5398-8F4B-497C00462DAA}"/>
+              </a:ext>
+            </a:extLst>
+          </p:cNvPr>
+          <p:cNvSpPr/>
+          <p:nvPr/>
+        </p:nvSpPr>
+        <p:spPr>
+          <a:xfrm>
+            <a:off x="5972175" y="4159251"/>
+            <a:ext cx="222250" cy="349250"/>
+          </a:xfrm>
+          <a:prstGeom prst="rect">
+            <a:avLst/>
+          </a:prstGeom>
+          <a:noFill/>
+          <a:ln>
+            <a:solidFill>
+              <a:srgbClr val="FF0000"/>
+            </a:solidFill>
+          </a:ln>
+        </p:spPr>
+        <p:style>
+          <a:lnRef idx="2">
+            <a:schemeClr val="accent1">
+              <a:shade val="15000"/>
+            </a:schemeClr>
+          </a:lnRef>
+          <a:fillRef idx="1">
+            <a:schemeClr val="accent1"/>
+          </a:fillRef>
+          <a:effectRef idx="0">
+            <a:schemeClr val="accent1"/>
+          </a:effectRef>
+          <a:fontRef idx="minor">
+            <a:schemeClr val="lt1"/>
+          </a:fontRef>
+        </p:style>
+        <p:txBody>
+          <a:bodyPr rtlCol="0" anchor="ctr"/>
+          <a:lstStyle/>
+          <a:p>
+            <a:pPr algn="ctr"/>
+            <a:endParaRPr lang="en-NL"/>
+          </a:p>
+        </p:txBody>
+      </p:sp>
+      <p:sp>
+        <p:nvSpPr>
+          <p:cNvPr id="16" name="TextBox 15">
+            <a:extLst>
+              <a:ext uri="{FF2B5EF4-FFF2-40B4-BE49-F238E27FC236}">
+                <a16:creationId xmlns:a16="http://schemas.microsoft.com/office/drawing/2014/main" id="{D3A44498-4DBE-DFA6-D3A0-A14F52D76BF0}"/>
+              </a:ext>
+            </a:extLst>
+          </p:cNvPr>
+          <p:cNvSpPr txBox="1"/>
+          <p:nvPr/>
+        </p:nvSpPr>
+        <p:spPr>
+          <a:xfrm>
+            <a:off x="2834178" y="4480788"/>
+            <a:ext cx="1325073" cy="400110"/>
+          </a:xfrm>
+          <a:prstGeom prst="rect">
+            <a:avLst/>
+          </a:prstGeom>
+          <a:noFill/>
+        </p:spPr>
+        <p:txBody>
+          <a:bodyPr wrap="square" rtlCol="0">
+            <a:spAutoFit/>
+          </a:bodyPr>
+          <a:lstStyle/>
+          <a:p>
+            <a:r>
+              <a:rPr lang="en-GB" sz="1000" dirty="0"/>
+              <a:t>Add  or remove the selected workbench</a:t>
+            </a:r>
+            <a:endParaRPr lang="en-NL" sz="1000" dirty="0"/>
+          </a:p>
+        </p:txBody>
+      </p:sp>
+      <p:cxnSp>
+        <p:nvCxnSpPr>
+          <p:cNvPr id="17" name="Straight Arrow Connector 16">
+            <a:extLst>
+              <a:ext uri="{FF2B5EF4-FFF2-40B4-BE49-F238E27FC236}">
+                <a16:creationId xmlns:a16="http://schemas.microsoft.com/office/drawing/2014/main" id="{C10967E9-BFDC-FF92-4B9C-E692FF2DB786}"/>
+              </a:ext>
+            </a:extLst>
+          </p:cNvPr>
+          <p:cNvCxnSpPr>
+            <a:cxnSpLocks/>
+            <a:stCxn id="16" idx="3"/>
+          </p:cNvCxnSpPr>
+          <p:nvPr/>
+        </p:nvCxnSpPr>
+        <p:spPr>
+          <a:xfrm flipV="1">
+            <a:off x="4159251" y="4455110"/>
+            <a:ext cx="1812924" cy="225733"/>
+          </a:xfrm>
+          <a:prstGeom prst="straightConnector1">
+            <a:avLst/>
+          </a:prstGeom>
+          <a:ln>
+            <a:tailEnd type="triangle"/>
+          </a:ln>
+        </p:spPr>
+        <p:style>
+          <a:lnRef idx="2">
+            <a:schemeClr val="accent1"/>
+          </a:lnRef>
+          <a:fillRef idx="0">
+            <a:schemeClr val="accent1"/>
+          </a:fillRef>
+          <a:effectRef idx="1">
+            <a:schemeClr val="accent1"/>
+          </a:effectRef>
+          <a:fontRef idx="minor">
+            <a:schemeClr val="tx1"/>
+          </a:fontRef>
+        </p:style>
+      </p:cxnSp>
+    </p:spTree>
+    <p:extLst>
+      <p:ext uri="{BB962C8B-B14F-4D97-AF65-F5344CB8AC3E}">
+        <p14:creationId xmlns:p14="http://schemas.microsoft.com/office/powerpoint/2010/main" val="3054600370"/>
+      </p:ext>
+    </p:extLst>
+  </p:cSld>
+  <p:clrMapOvr>
+    <a:masterClrMapping/>
+  </p:clrMapOvr>
+</p:sld>
+</file>
+
+<file path=ppt/slides/slide7.xml><?xml version="1.0" encoding="utf-8"?>
+<p:sld xmlns:a="http://schemas.openxmlformats.org/drawingml/2006/main" xmlns:r="http://schemas.openxmlformats.org/officeDocument/2006/relationships" xmlns:p="http://schemas.openxmlformats.org/presentationml/2006/main">
+  <p:cSld>
+    <p:spTree>
+      <p:nvGrpSpPr>
+        <p:cNvPr id="1" name=""/>
+        <p:cNvGrpSpPr/>
+        <p:nvPr/>
+      </p:nvGrpSpPr>
+      <p:grpSpPr>
+        <a:xfrm>
+          <a:off x="0" y="0"/>
+          <a:ext cx="0" cy="0"/>
+          <a:chOff x="0" y="0"/>
+          <a:chExt cx="0" cy="0"/>
+        </a:xfrm>
+      </p:grpSpPr>
+      <p:pic>
+        <p:nvPicPr>
+          <p:cNvPr id="18" name="Content Placeholder 17">
+            <a:extLst>
+              <a:ext uri="{FF2B5EF4-FFF2-40B4-BE49-F238E27FC236}">
+                <a16:creationId xmlns:a16="http://schemas.microsoft.com/office/drawing/2014/main" id="{C240941A-82E0-F7A8-F8D5-DE6F9A5979F7}"/>
+              </a:ext>
+            </a:extLst>
+          </p:cNvPr>
+          <p:cNvPicPr>
+            <a:picLocks noGrp="1" noChangeAspect="1"/>
+          </p:cNvPicPr>
+          <p:nvPr>
+            <p:ph idx="1"/>
+          </p:nvPr>
+        </p:nvPicPr>
+        <p:blipFill>
+          <a:blip r:embed="rId2"/>
+          <a:stretch>
+            <a:fillRect/>
+          </a:stretch>
+        </p:blipFill>
+        <p:spPr>
+          <a:xfrm>
+            <a:off x="4398855" y="1781175"/>
+            <a:ext cx="3349839" cy="4351338"/>
+          </a:xfrm>
+        </p:spPr>
+      </p:pic>
+      <p:sp>
+        <p:nvSpPr>
+          <p:cNvPr id="7" name="TextBox 6">
+            <a:extLst>
+              <a:ext uri="{FF2B5EF4-FFF2-40B4-BE49-F238E27FC236}">
+                <a16:creationId xmlns:a16="http://schemas.microsoft.com/office/drawing/2014/main" id="{F88312ED-7E47-94E3-7FE4-FCE3ACA02173}"/>
+              </a:ext>
+            </a:extLst>
+          </p:cNvPr>
+          <p:cNvSpPr txBox="1"/>
+          <p:nvPr/>
+        </p:nvSpPr>
+        <p:spPr>
+          <a:xfrm>
+            <a:off x="3092451" y="1250587"/>
+            <a:ext cx="1466849" cy="400110"/>
+          </a:xfrm>
+          <a:prstGeom prst="rect">
+            <a:avLst/>
+          </a:prstGeom>
+          <a:noFill/>
+        </p:spPr>
+        <p:txBody>
+          <a:bodyPr wrap="square" rtlCol="0">
+            <a:spAutoFit/>
+          </a:bodyPr>
+          <a:lstStyle/>
+          <a:p>
+            <a:r>
+              <a:rPr lang="en-GB" sz="1000" dirty="0"/>
+              <a:t>Select existing custom panels or select “New”</a:t>
+            </a:r>
+            <a:endParaRPr lang="en-NL" sz="1000" dirty="0"/>
+          </a:p>
+        </p:txBody>
+      </p:sp>
+      <p:cxnSp>
+        <p:nvCxnSpPr>
+          <p:cNvPr id="8" name="Straight Arrow Connector 7">
+            <a:extLst>
+              <a:ext uri="{FF2B5EF4-FFF2-40B4-BE49-F238E27FC236}">
+                <a16:creationId xmlns:a16="http://schemas.microsoft.com/office/drawing/2014/main" id="{0EC02992-18C9-5AF5-3D7C-A8B9138D1AAB}"/>
+              </a:ext>
+            </a:extLst>
+          </p:cNvPr>
+          <p:cNvCxnSpPr>
+            <a:cxnSpLocks/>
+            <a:stCxn id="7" idx="3"/>
+          </p:cNvCxnSpPr>
+          <p:nvPr/>
+        </p:nvCxnSpPr>
+        <p:spPr>
+          <a:xfrm>
+            <a:off x="4559300" y="1450642"/>
+            <a:ext cx="914400" cy="785015"/>
+          </a:xfrm>
+          <a:prstGeom prst="straightConnector1">
+            <a:avLst/>
+          </a:prstGeom>
+          <a:ln>
+            <a:tailEnd type="triangle"/>
+          </a:ln>
+        </p:spPr>
+        <p:style>
+          <a:lnRef idx="2">
+            <a:schemeClr val="accent1"/>
+          </a:lnRef>
+          <a:fillRef idx="0">
+            <a:schemeClr val="accent1"/>
+          </a:fillRef>
+          <a:effectRef idx="1">
+            <a:schemeClr val="accent1"/>
+          </a:effectRef>
+          <a:fontRef idx="minor">
+            <a:schemeClr val="tx1"/>
+          </a:fontRef>
+        </p:style>
+      </p:cxnSp>
+      <p:sp>
+        <p:nvSpPr>
+          <p:cNvPr id="9" name="TextBox 8">
+            <a:extLst>
+              <a:ext uri="{FF2B5EF4-FFF2-40B4-BE49-F238E27FC236}">
+                <a16:creationId xmlns:a16="http://schemas.microsoft.com/office/drawing/2014/main" id="{2F5F8255-0DD3-D163-021F-C34F1F51322C}"/>
+              </a:ext>
+            </a:extLst>
+          </p:cNvPr>
+          <p:cNvSpPr txBox="1"/>
+          <p:nvPr/>
+        </p:nvSpPr>
+        <p:spPr>
+          <a:xfrm>
+            <a:off x="2898776" y="3559199"/>
+            <a:ext cx="1035050" cy="246221"/>
+          </a:xfrm>
+          <a:prstGeom prst="rect">
+            <a:avLst/>
+          </a:prstGeom>
+          <a:noFill/>
+        </p:spPr>
+        <p:txBody>
+          <a:bodyPr wrap="square" rtlCol="0">
+            <a:spAutoFit/>
+          </a:bodyPr>
+          <a:lstStyle/>
+          <a:p>
+            <a:r>
+              <a:rPr lang="en-GB" sz="1000" dirty="0"/>
+              <a:t>Toolbars to add</a:t>
+            </a:r>
+            <a:endParaRPr lang="en-NL" sz="1000" dirty="0"/>
+          </a:p>
+        </p:txBody>
+      </p:sp>
+      <p:cxnSp>
+        <p:nvCxnSpPr>
+          <p:cNvPr id="10" name="Straight Arrow Connector 9">
+            <a:extLst>
+              <a:ext uri="{FF2B5EF4-FFF2-40B4-BE49-F238E27FC236}">
+                <a16:creationId xmlns:a16="http://schemas.microsoft.com/office/drawing/2014/main" id="{7260D10E-8B1A-5D6D-4959-7BA7CA33E0BF}"/>
+              </a:ext>
+            </a:extLst>
+          </p:cNvPr>
+          <p:cNvCxnSpPr>
+            <a:cxnSpLocks/>
+            <a:stCxn id="9" idx="3"/>
+          </p:cNvCxnSpPr>
+          <p:nvPr/>
+        </p:nvCxnSpPr>
+        <p:spPr>
+          <a:xfrm>
+            <a:off x="3933826" y="3682310"/>
+            <a:ext cx="625474" cy="0"/>
+          </a:xfrm>
+          <a:prstGeom prst="straightConnector1">
+            <a:avLst/>
+          </a:prstGeom>
+          <a:ln>
+            <a:tailEnd type="triangle"/>
+          </a:ln>
+        </p:spPr>
+        <p:style>
+          <a:lnRef idx="2">
+            <a:schemeClr val="accent1"/>
+          </a:lnRef>
+          <a:fillRef idx="0">
+            <a:schemeClr val="accent1"/>
+          </a:fillRef>
+          <a:effectRef idx="1">
+            <a:schemeClr val="accent1"/>
+          </a:effectRef>
+          <a:fontRef idx="minor">
+            <a:schemeClr val="tx1"/>
+          </a:fontRef>
+        </p:style>
+      </p:cxnSp>
+      <p:sp>
+        <p:nvSpPr>
+          <p:cNvPr id="11" name="TextBox 10">
+            <a:extLst>
+              <a:ext uri="{FF2B5EF4-FFF2-40B4-BE49-F238E27FC236}">
+                <a16:creationId xmlns:a16="http://schemas.microsoft.com/office/drawing/2014/main" id="{94169275-7275-F2E1-CD14-E969B6F0B1C7}"/>
+              </a:ext>
+            </a:extLst>
+          </p:cNvPr>
+          <p:cNvSpPr txBox="1"/>
+          <p:nvPr/>
+        </p:nvSpPr>
+        <p:spPr>
+          <a:xfrm>
+            <a:off x="8413750" y="3474127"/>
+            <a:ext cx="1242523" cy="400110"/>
+          </a:xfrm>
+          <a:prstGeom prst="rect">
+            <a:avLst/>
+          </a:prstGeom>
+          <a:noFill/>
+        </p:spPr>
+        <p:txBody>
+          <a:bodyPr wrap="square" rtlCol="0">
+            <a:spAutoFit/>
+          </a:bodyPr>
+          <a:lstStyle/>
+          <a:p>
+            <a:r>
+              <a:rPr lang="en-GB" sz="1000" dirty="0"/>
+              <a:t>Commands of added toolbars</a:t>
+            </a:r>
+            <a:endParaRPr lang="en-NL" sz="1000" dirty="0"/>
+          </a:p>
+        </p:txBody>
+      </p:sp>
+      <p:cxnSp>
+        <p:nvCxnSpPr>
+          <p:cNvPr id="12" name="Straight Arrow Connector 11">
+            <a:extLst>
+              <a:ext uri="{FF2B5EF4-FFF2-40B4-BE49-F238E27FC236}">
+                <a16:creationId xmlns:a16="http://schemas.microsoft.com/office/drawing/2014/main" id="{6113C080-C7E3-90E1-9E43-4D5CF6D92245}"/>
+              </a:ext>
+            </a:extLst>
+          </p:cNvPr>
+          <p:cNvCxnSpPr>
+            <a:cxnSpLocks/>
+            <a:stCxn id="11" idx="1"/>
+          </p:cNvCxnSpPr>
+          <p:nvPr/>
+        </p:nvCxnSpPr>
+        <p:spPr>
+          <a:xfrm flipH="1">
+            <a:off x="7543800" y="3674182"/>
+            <a:ext cx="869950" cy="0"/>
+          </a:xfrm>
+          <a:prstGeom prst="straightConnector1">
+            <a:avLst/>
+          </a:prstGeom>
+          <a:ln>
+            <a:tailEnd type="triangle"/>
+          </a:ln>
+        </p:spPr>
+        <p:style>
+          <a:lnRef idx="2">
+            <a:schemeClr val="accent1"/>
+          </a:lnRef>
+          <a:fillRef idx="0">
+            <a:schemeClr val="accent1"/>
+          </a:fillRef>
+          <a:effectRef idx="1">
+            <a:schemeClr val="accent1"/>
+          </a:effectRef>
+          <a:fontRef idx="minor">
+            <a:schemeClr val="tx1"/>
+          </a:fontRef>
+        </p:style>
+      </p:cxnSp>
+      <p:sp>
+        <p:nvSpPr>
+          <p:cNvPr id="13" name="Rectangle 12">
+            <a:extLst>
+              <a:ext uri="{FF2B5EF4-FFF2-40B4-BE49-F238E27FC236}">
+                <a16:creationId xmlns:a16="http://schemas.microsoft.com/office/drawing/2014/main" id="{AC0B82A3-6D15-AB41-12EB-1621B6C88E97}"/>
+              </a:ext>
+            </a:extLst>
+          </p:cNvPr>
+          <p:cNvSpPr/>
+          <p:nvPr/>
+        </p:nvSpPr>
+        <p:spPr>
+          <a:xfrm>
+            <a:off x="5962650" y="4064000"/>
+            <a:ext cx="222250" cy="177800"/>
+          </a:xfrm>
+          <a:prstGeom prst="rect">
+            <a:avLst/>
+          </a:prstGeom>
+          <a:noFill/>
+          <a:ln>
+            <a:solidFill>
+              <a:srgbClr val="FF0000"/>
+            </a:solidFill>
+          </a:ln>
+        </p:spPr>
+        <p:style>
+          <a:lnRef idx="2">
+            <a:schemeClr val="accent1">
+              <a:shade val="15000"/>
+            </a:schemeClr>
+          </a:lnRef>
+          <a:fillRef idx="1">
+            <a:schemeClr val="accent1"/>
+          </a:fillRef>
+          <a:effectRef idx="0">
+            <a:schemeClr val="accent1"/>
+          </a:effectRef>
+          <a:fontRef idx="minor">
+            <a:schemeClr val="lt1"/>
+          </a:fontRef>
+        </p:style>
+        <p:txBody>
+          <a:bodyPr rtlCol="0" anchor="ctr"/>
+          <a:lstStyle/>
+          <a:p>
+            <a:pPr algn="ctr"/>
+            <a:endParaRPr lang="en-NL"/>
+          </a:p>
+        </p:txBody>
+      </p:sp>
+      <p:sp>
+        <p:nvSpPr>
+          <p:cNvPr id="14" name="Rectangle 13">
+            <a:extLst>
+              <a:ext uri="{FF2B5EF4-FFF2-40B4-BE49-F238E27FC236}">
+                <a16:creationId xmlns:a16="http://schemas.microsoft.com/office/drawing/2014/main" id="{73FD7167-2B09-97BF-E2BA-4255EE366A6C}"/>
+              </a:ext>
+            </a:extLst>
+          </p:cNvPr>
+          <p:cNvSpPr/>
+          <p:nvPr/>
+        </p:nvSpPr>
+        <p:spPr>
+          <a:xfrm>
+            <a:off x="5972175" y="4438650"/>
+            <a:ext cx="222250" cy="349250"/>
+          </a:xfrm>
+          <a:prstGeom prst="rect">
+            <a:avLst/>
+          </a:prstGeom>
+          <a:noFill/>
+          <a:ln>
+            <a:solidFill>
+              <a:srgbClr val="FF0000"/>
+            </a:solidFill>
+          </a:ln>
+        </p:spPr>
+        <p:style>
+          <a:lnRef idx="2">
+            <a:schemeClr val="accent1">
+              <a:shade val="15000"/>
+            </a:schemeClr>
+          </a:lnRef>
+          <a:fillRef idx="1">
+            <a:schemeClr val="accent1"/>
+          </a:fillRef>
+          <a:effectRef idx="0">
+            <a:schemeClr val="accent1"/>
+          </a:effectRef>
+          <a:fontRef idx="minor">
+            <a:schemeClr val="lt1"/>
+          </a:fontRef>
+        </p:style>
+        <p:txBody>
+          <a:bodyPr rtlCol="0" anchor="ctr"/>
+          <a:lstStyle/>
+          <a:p>
+            <a:pPr algn="ctr"/>
+            <a:endParaRPr lang="en-NL"/>
+          </a:p>
+        </p:txBody>
+      </p:sp>
+      <p:sp>
+        <p:nvSpPr>
+          <p:cNvPr id="23" name="TextBox 22">
+            <a:extLst>
+              <a:ext uri="{FF2B5EF4-FFF2-40B4-BE49-F238E27FC236}">
+                <a16:creationId xmlns:a16="http://schemas.microsoft.com/office/drawing/2014/main" id="{CA3FA59D-D70B-46CF-D034-A241311A8BC2}"/>
+              </a:ext>
+            </a:extLst>
+          </p:cNvPr>
+          <p:cNvSpPr txBox="1"/>
+          <p:nvPr/>
+        </p:nvSpPr>
+        <p:spPr>
+          <a:xfrm>
+            <a:off x="3003549" y="2235657"/>
+            <a:ext cx="1270001" cy="246221"/>
+          </a:xfrm>
+          <a:prstGeom prst="rect">
+            <a:avLst/>
+          </a:prstGeom>
+          <a:noFill/>
+        </p:spPr>
+        <p:txBody>
+          <a:bodyPr wrap="square" rtlCol="0">
+            <a:spAutoFit/>
+          </a:bodyPr>
+          <a:lstStyle/>
+          <a:p>
+            <a:r>
+              <a:rPr lang="en-GB" sz="1000" dirty="0"/>
+              <a:t>Select a workbench</a:t>
+            </a:r>
+            <a:endParaRPr lang="en-NL" sz="1000" dirty="0"/>
+          </a:p>
+        </p:txBody>
+      </p:sp>
+      <p:cxnSp>
+        <p:nvCxnSpPr>
+          <p:cNvPr id="24" name="Straight Arrow Connector 23">
+            <a:extLst>
+              <a:ext uri="{FF2B5EF4-FFF2-40B4-BE49-F238E27FC236}">
+                <a16:creationId xmlns:a16="http://schemas.microsoft.com/office/drawing/2014/main" id="{6A47A634-49A8-D53E-FBBB-4AA95CAD0563}"/>
+              </a:ext>
+            </a:extLst>
+          </p:cNvPr>
+          <p:cNvCxnSpPr>
+            <a:cxnSpLocks/>
+            <a:stCxn id="23" idx="3"/>
+          </p:cNvCxnSpPr>
+          <p:nvPr/>
+        </p:nvCxnSpPr>
+        <p:spPr>
+          <a:xfrm>
+            <a:off x="4273550" y="2358768"/>
+            <a:ext cx="939800" cy="136782"/>
+          </a:xfrm>
+          <a:prstGeom prst="straightConnector1">
+            <a:avLst/>
+          </a:prstGeom>
+          <a:ln>
+            <a:tailEnd type="triangle"/>
+          </a:ln>
+        </p:spPr>
+        <p:style>
+          <a:lnRef idx="2">
+            <a:schemeClr val="accent1"/>
+          </a:lnRef>
+          <a:fillRef idx="0">
+            <a:schemeClr val="accent1"/>
+          </a:fillRef>
+          <a:effectRef idx="1">
+            <a:schemeClr val="accent1"/>
+          </a:effectRef>
+          <a:fontRef idx="minor">
+            <a:schemeClr val="tx1"/>
+          </a:fontRef>
+        </p:style>
+      </p:cxnSp>
+      <p:sp>
+        <p:nvSpPr>
+          <p:cNvPr id="30" name="TextBox 29">
+            <a:extLst>
+              <a:ext uri="{FF2B5EF4-FFF2-40B4-BE49-F238E27FC236}">
+                <a16:creationId xmlns:a16="http://schemas.microsoft.com/office/drawing/2014/main" id="{596A8825-0A43-FFD4-C3A5-08CDDF7D44AB}"/>
+              </a:ext>
+            </a:extLst>
+          </p:cNvPr>
+          <p:cNvSpPr txBox="1"/>
+          <p:nvPr/>
+        </p:nvSpPr>
+        <p:spPr>
+          <a:xfrm>
+            <a:off x="2489200" y="2673897"/>
+            <a:ext cx="1784351" cy="400110"/>
+          </a:xfrm>
+          <a:prstGeom prst="rect">
+            <a:avLst/>
+          </a:prstGeom>
+          <a:noFill/>
+        </p:spPr>
+        <p:txBody>
+          <a:bodyPr wrap="square" rtlCol="0">
+            <a:spAutoFit/>
+          </a:bodyPr>
+          <a:lstStyle/>
+          <a:p>
+            <a:r>
+              <a:rPr lang="en-GB" sz="1000" dirty="0"/>
+              <a:t>Input box to enter the name of a new custom panel</a:t>
+            </a:r>
+            <a:endParaRPr lang="en-NL" sz="1000" dirty="0"/>
+          </a:p>
+        </p:txBody>
+      </p:sp>
+      <p:cxnSp>
+        <p:nvCxnSpPr>
+          <p:cNvPr id="31" name="Straight Arrow Connector 30">
+            <a:extLst>
+              <a:ext uri="{FF2B5EF4-FFF2-40B4-BE49-F238E27FC236}">
+                <a16:creationId xmlns:a16="http://schemas.microsoft.com/office/drawing/2014/main" id="{1CF6244B-A4EB-4FE3-923A-604EF249773D}"/>
+              </a:ext>
+            </a:extLst>
+          </p:cNvPr>
+          <p:cNvCxnSpPr>
+            <a:cxnSpLocks/>
+            <a:stCxn id="30" idx="3"/>
+          </p:cNvCxnSpPr>
+          <p:nvPr/>
+        </p:nvCxnSpPr>
+        <p:spPr>
+          <a:xfrm flipV="1">
+            <a:off x="4273551" y="2766245"/>
+            <a:ext cx="939799" cy="107707"/>
+          </a:xfrm>
+          <a:prstGeom prst="straightConnector1">
+            <a:avLst/>
+          </a:prstGeom>
+          <a:ln>
+            <a:tailEnd type="triangle"/>
+          </a:ln>
+        </p:spPr>
+        <p:style>
+          <a:lnRef idx="2">
+            <a:schemeClr val="accent1"/>
+          </a:lnRef>
+          <a:fillRef idx="0">
+            <a:schemeClr val="accent1"/>
+          </a:fillRef>
+          <a:effectRef idx="1">
+            <a:schemeClr val="accent1"/>
+          </a:effectRef>
+          <a:fontRef idx="minor">
+            <a:schemeClr val="tx1"/>
+          </a:fontRef>
+        </p:style>
+      </p:cxnSp>
+      <p:sp>
+        <p:nvSpPr>
+          <p:cNvPr id="34" name="TextBox 33">
+            <a:extLst>
+              <a:ext uri="{FF2B5EF4-FFF2-40B4-BE49-F238E27FC236}">
+                <a16:creationId xmlns:a16="http://schemas.microsoft.com/office/drawing/2014/main" id="{7EBD6304-CAF8-3AFF-D0BA-4D89673669B2}"/>
+              </a:ext>
+            </a:extLst>
+          </p:cNvPr>
+          <p:cNvSpPr txBox="1"/>
+          <p:nvPr/>
+        </p:nvSpPr>
+        <p:spPr>
+          <a:xfrm>
+            <a:off x="8352326" y="1996771"/>
+            <a:ext cx="1242523" cy="400110"/>
+          </a:xfrm>
+          <a:prstGeom prst="rect">
+            <a:avLst/>
+          </a:prstGeom>
+          <a:noFill/>
+        </p:spPr>
+        <p:txBody>
+          <a:bodyPr wrap="square" rtlCol="0">
+            <a:spAutoFit/>
+          </a:bodyPr>
+          <a:lstStyle/>
+          <a:p>
+            <a:r>
+              <a:rPr lang="en-GB" sz="1000" dirty="0"/>
+              <a:t>Remove a custom panel</a:t>
+            </a:r>
+            <a:endParaRPr lang="en-NL" sz="1000" dirty="0"/>
+          </a:p>
+        </p:txBody>
+      </p:sp>
+      <p:cxnSp>
+        <p:nvCxnSpPr>
+          <p:cNvPr id="35" name="Straight Arrow Connector 34">
+            <a:extLst>
+              <a:ext uri="{FF2B5EF4-FFF2-40B4-BE49-F238E27FC236}">
+                <a16:creationId xmlns:a16="http://schemas.microsoft.com/office/drawing/2014/main" id="{8B59A17B-13A2-6048-FA4F-2E4836DF0E96}"/>
+              </a:ext>
+            </a:extLst>
+          </p:cNvPr>
+          <p:cNvCxnSpPr>
+            <a:cxnSpLocks/>
+            <a:stCxn id="34" idx="1"/>
+          </p:cNvCxnSpPr>
+          <p:nvPr/>
+        </p:nvCxnSpPr>
+        <p:spPr>
+          <a:xfrm flipH="1">
+            <a:off x="7626350" y="2196826"/>
+            <a:ext cx="725976" cy="108224"/>
+          </a:xfrm>
+          <a:prstGeom prst="straightConnector1">
+            <a:avLst/>
+          </a:prstGeom>
+          <a:ln>
+            <a:tailEnd type="triangle"/>
+          </a:ln>
+        </p:spPr>
+        <p:style>
+          <a:lnRef idx="2">
+            <a:schemeClr val="accent1"/>
+          </a:lnRef>
+          <a:fillRef idx="0">
+            <a:schemeClr val="accent1"/>
+          </a:fillRef>
+          <a:effectRef idx="1">
+            <a:schemeClr val="accent1"/>
+          </a:effectRef>
+          <a:fontRef idx="minor">
+            <a:schemeClr val="tx1"/>
+          </a:fontRef>
+        </p:style>
+      </p:cxnSp>
+      <p:sp>
+        <p:nvSpPr>
+          <p:cNvPr id="37" name="TextBox 36">
+            <a:extLst>
+              <a:ext uri="{FF2B5EF4-FFF2-40B4-BE49-F238E27FC236}">
+                <a16:creationId xmlns:a16="http://schemas.microsoft.com/office/drawing/2014/main" id="{D36DCC47-B4A7-0BB8-2D2C-7C4E0438B661}"/>
+              </a:ext>
+            </a:extLst>
+          </p:cNvPr>
+          <p:cNvSpPr txBox="1"/>
+          <p:nvPr/>
+        </p:nvSpPr>
+        <p:spPr>
+          <a:xfrm>
+            <a:off x="8352326" y="2612822"/>
+            <a:ext cx="1242523" cy="400110"/>
+          </a:xfrm>
+          <a:prstGeom prst="rect">
+            <a:avLst/>
+          </a:prstGeom>
+          <a:noFill/>
+        </p:spPr>
+        <p:txBody>
+          <a:bodyPr wrap="square" rtlCol="0">
+            <a:spAutoFit/>
+          </a:bodyPr>
+          <a:lstStyle/>
+          <a:p>
+            <a:r>
+              <a:rPr lang="en-GB" sz="1000" dirty="0"/>
+              <a:t>Add a custom panel</a:t>
+            </a:r>
+            <a:endParaRPr lang="en-NL" sz="1000" dirty="0"/>
+          </a:p>
+        </p:txBody>
+      </p:sp>
+      <p:cxnSp>
+        <p:nvCxnSpPr>
+          <p:cNvPr id="38" name="Straight Arrow Connector 37">
+            <a:extLst>
+              <a:ext uri="{FF2B5EF4-FFF2-40B4-BE49-F238E27FC236}">
+                <a16:creationId xmlns:a16="http://schemas.microsoft.com/office/drawing/2014/main" id="{8A05335B-F278-4DCF-8AC2-6B6433BCAD1B}"/>
+              </a:ext>
+            </a:extLst>
+          </p:cNvPr>
+          <p:cNvCxnSpPr>
+            <a:cxnSpLocks/>
+            <a:stCxn id="37" idx="1"/>
+          </p:cNvCxnSpPr>
+          <p:nvPr/>
+        </p:nvCxnSpPr>
+        <p:spPr>
+          <a:xfrm flipH="1" flipV="1">
+            <a:off x="7626350" y="2766245"/>
+            <a:ext cx="725976" cy="46632"/>
+          </a:xfrm>
+          <a:prstGeom prst="straightConnector1">
+            <a:avLst/>
+          </a:prstGeom>
+          <a:ln>
+            <a:tailEnd type="triangle"/>
+          </a:ln>
+        </p:spPr>
+        <p:style>
+          <a:lnRef idx="2">
+            <a:schemeClr val="accent1"/>
+          </a:lnRef>
+          <a:fillRef idx="0">
+            <a:schemeClr val="accent1"/>
+          </a:fillRef>
+          <a:effectRef idx="1">
+            <a:schemeClr val="accent1"/>
+          </a:effectRef>
+          <a:fontRef idx="minor">
+            <a:schemeClr val="tx1"/>
+          </a:fontRef>
+        </p:style>
+      </p:cxnSp>
+      <p:sp>
+        <p:nvSpPr>
+          <p:cNvPr id="43" name="TextBox 42">
+            <a:extLst>
+              <a:ext uri="{FF2B5EF4-FFF2-40B4-BE49-F238E27FC236}">
+                <a16:creationId xmlns:a16="http://schemas.microsoft.com/office/drawing/2014/main" id="{AAB97CE3-2129-8055-3E08-64471B2F773D}"/>
+              </a:ext>
+            </a:extLst>
+          </p:cNvPr>
+          <p:cNvSpPr txBox="1"/>
+          <p:nvPr/>
+        </p:nvSpPr>
+        <p:spPr>
+          <a:xfrm>
+            <a:off x="2898776" y="4206166"/>
+            <a:ext cx="1250950" cy="400110"/>
+          </a:xfrm>
+          <a:prstGeom prst="rect">
+            <a:avLst/>
+          </a:prstGeom>
+          <a:noFill/>
+        </p:spPr>
+        <p:txBody>
+          <a:bodyPr wrap="square" rtlCol="0">
+            <a:spAutoFit/>
+          </a:bodyPr>
+          <a:lstStyle/>
+          <a:p>
+            <a:r>
+              <a:rPr lang="en-GB" sz="1000" dirty="0"/>
+              <a:t>Add the selected toolbar(s)</a:t>
+            </a:r>
+            <a:endParaRPr lang="en-NL" sz="1000" dirty="0"/>
+          </a:p>
+        </p:txBody>
+      </p:sp>
+      <p:cxnSp>
+        <p:nvCxnSpPr>
+          <p:cNvPr id="44" name="Straight Arrow Connector 43">
+            <a:extLst>
+              <a:ext uri="{FF2B5EF4-FFF2-40B4-BE49-F238E27FC236}">
+                <a16:creationId xmlns:a16="http://schemas.microsoft.com/office/drawing/2014/main" id="{69C3798F-70D1-27B1-EA42-978069DB4095}"/>
+              </a:ext>
+            </a:extLst>
+          </p:cNvPr>
+          <p:cNvCxnSpPr>
+            <a:cxnSpLocks/>
+            <a:stCxn id="43" idx="3"/>
+          </p:cNvCxnSpPr>
+          <p:nvPr/>
+        </p:nvCxnSpPr>
+        <p:spPr>
+          <a:xfrm flipV="1">
+            <a:off x="4149726" y="4180488"/>
+            <a:ext cx="1812924" cy="225733"/>
+          </a:xfrm>
+          <a:prstGeom prst="straightConnector1">
+            <a:avLst/>
+          </a:prstGeom>
+          <a:ln>
+            <a:tailEnd type="triangle"/>
+          </a:ln>
+        </p:spPr>
+        <p:style>
+          <a:lnRef idx="2">
+            <a:schemeClr val="accent1"/>
+          </a:lnRef>
+          <a:fillRef idx="0">
+            <a:schemeClr val="accent1"/>
+          </a:fillRef>
+          <a:effectRef idx="1">
+            <a:schemeClr val="accent1"/>
+          </a:effectRef>
+          <a:fontRef idx="minor">
+            <a:schemeClr val="tx1"/>
+          </a:fontRef>
+        </p:style>
+      </p:cxnSp>
+      <p:sp>
+        <p:nvSpPr>
+          <p:cNvPr id="54" name="TextBox 53">
+            <a:extLst>
+              <a:ext uri="{FF2B5EF4-FFF2-40B4-BE49-F238E27FC236}">
+                <a16:creationId xmlns:a16="http://schemas.microsoft.com/office/drawing/2014/main" id="{5871B5E6-226E-93ED-FFE2-808A1273083F}"/>
+              </a:ext>
+            </a:extLst>
+          </p:cNvPr>
+          <p:cNvSpPr txBox="1"/>
+          <p:nvPr/>
+        </p:nvSpPr>
+        <p:spPr>
+          <a:xfrm>
+            <a:off x="2438400" y="4760801"/>
+            <a:ext cx="1495426" cy="400110"/>
+          </a:xfrm>
+          <a:prstGeom prst="rect">
+            <a:avLst/>
+          </a:prstGeom>
+          <a:noFill/>
+        </p:spPr>
+        <p:txBody>
+          <a:bodyPr wrap="square" rtlCol="0">
+            <a:spAutoFit/>
+          </a:bodyPr>
+          <a:lstStyle/>
+          <a:p>
+            <a:r>
+              <a:rPr lang="en-GB" sz="1000" dirty="0"/>
+              <a:t>Move selected commands up or down</a:t>
+            </a:r>
+            <a:endParaRPr lang="en-NL" sz="1000" dirty="0"/>
+          </a:p>
+        </p:txBody>
+      </p:sp>
+      <p:cxnSp>
+        <p:nvCxnSpPr>
+          <p:cNvPr id="55" name="Straight Arrow Connector 54">
+            <a:extLst>
+              <a:ext uri="{FF2B5EF4-FFF2-40B4-BE49-F238E27FC236}">
+                <a16:creationId xmlns:a16="http://schemas.microsoft.com/office/drawing/2014/main" id="{51D44EE5-8017-D3A2-0B44-DDD660F3D486}"/>
+              </a:ext>
+            </a:extLst>
+          </p:cNvPr>
+          <p:cNvCxnSpPr>
+            <a:cxnSpLocks/>
+            <a:stCxn id="54" idx="3"/>
+          </p:cNvCxnSpPr>
+          <p:nvPr/>
+        </p:nvCxnSpPr>
+        <p:spPr>
+          <a:xfrm flipV="1">
+            <a:off x="3933826" y="4631954"/>
+            <a:ext cx="2028824" cy="328902"/>
+          </a:xfrm>
+          <a:prstGeom prst="straightConnector1">
+            <a:avLst/>
+          </a:prstGeom>
+          <a:ln>
+            <a:tailEnd type="triangle"/>
+          </a:ln>
+        </p:spPr>
+        <p:style>
+          <a:lnRef idx="2">
+            <a:schemeClr val="accent1"/>
+          </a:lnRef>
+          <a:fillRef idx="0">
+            <a:schemeClr val="accent1"/>
+          </a:fillRef>
+          <a:effectRef idx="1">
+            <a:schemeClr val="accent1"/>
+          </a:effectRef>
+          <a:fontRef idx="minor">
+            <a:schemeClr val="tx1"/>
+          </a:fontRef>
+        </p:style>
+      </p:cxnSp>
+    </p:spTree>
+    <p:extLst>
+      <p:ext uri="{BB962C8B-B14F-4D97-AF65-F5344CB8AC3E}">
+        <p14:creationId xmlns:p14="http://schemas.microsoft.com/office/powerpoint/2010/main" val="1855102817"/>
+      </p:ext>
+    </p:extLst>
+  </p:cSld>
+  <p:clrMapOvr>
+    <a:masterClrMapping/>
+  </p:clrMapOvr>
+</p:sld>
+</file>
+
+<file path=ppt/slides/slide8.xml><?xml version="1.0" encoding="utf-8"?>
+<p:sld xmlns:a="http://schemas.openxmlformats.org/drawingml/2006/main" xmlns:r="http://schemas.openxmlformats.org/officeDocument/2006/relationships" xmlns:p="http://schemas.openxmlformats.org/presentationml/2006/main">
+  <p:cSld>
+    <p:spTree>
+      <p:nvGrpSpPr>
+        <p:cNvPr id="1" name=""/>
+        <p:cNvGrpSpPr/>
+        <p:nvPr/>
+      </p:nvGrpSpPr>
+      <p:grpSpPr>
+        <a:xfrm>
+          <a:off x="0" y="0"/>
+          <a:ext cx="0" cy="0"/>
+          <a:chOff x="0" y="0"/>
+          <a:chExt cx="0" cy="0"/>
+        </a:xfrm>
+      </p:grpSpPr>
+      <p:pic>
+        <p:nvPicPr>
+          <p:cNvPr id="5" name="Content Placeholder 4" descr="A screenshot of a computer&#10;&#10;Description automatically generated">
+            <a:extLst>
+              <a:ext uri="{FF2B5EF4-FFF2-40B4-BE49-F238E27FC236}">
+                <a16:creationId xmlns:a16="http://schemas.microsoft.com/office/drawing/2014/main" id="{F3DAC720-C3AF-E1F3-F67A-E44AC907C43A}"/>
+              </a:ext>
+            </a:extLst>
+          </p:cNvPr>
+          <p:cNvPicPr>
+            <a:picLocks noGrp="1" noChangeAspect="1"/>
+          </p:cNvPicPr>
+          <p:nvPr>
+            <p:ph idx="1"/>
+          </p:nvPr>
+        </p:nvPicPr>
+        <p:blipFill>
+          <a:blip r:embed="rId2">
+            <a:extLst>
+              <a:ext uri="{28A0092B-C50C-407E-A947-70E740481C1C}">
+                <a14:useLocalDpi xmlns:a14="http://schemas.microsoft.com/office/drawing/2010/main" val="0"/>
+              </a:ext>
+            </a:extLst>
+          </a:blip>
+          <a:stretch>
+            <a:fillRect/>
+          </a:stretch>
+        </p:blipFill>
+        <p:spPr>
+          <a:xfrm>
+            <a:off x="3385047" y="1825625"/>
+            <a:ext cx="5421905" cy="4351338"/>
+          </a:xfrm>
+        </p:spPr>
+      </p:pic>
+      <p:sp>
+        <p:nvSpPr>
+          <p:cNvPr id="6" name="Rectangle 5">
+            <a:extLst>
+              <a:ext uri="{FF2B5EF4-FFF2-40B4-BE49-F238E27FC236}">
+                <a16:creationId xmlns:a16="http://schemas.microsoft.com/office/drawing/2014/main" id="{20207BFB-6B73-E5D5-F422-A6DF64B8CAD0}"/>
+              </a:ext>
+            </a:extLst>
+          </p:cNvPr>
+          <p:cNvSpPr/>
+          <p:nvPr/>
+        </p:nvSpPr>
+        <p:spPr>
+          <a:xfrm>
+            <a:off x="6416675" y="4064000"/>
+            <a:ext cx="222250" cy="349250"/>
+          </a:xfrm>
+          <a:prstGeom prst="rect">
+            <a:avLst/>
+          </a:prstGeom>
+          <a:noFill/>
+          <a:ln>
+            <a:solidFill>
+              <a:srgbClr val="FF0000"/>
+            </a:solidFill>
+          </a:ln>
+        </p:spPr>
+        <p:style>
+          <a:lnRef idx="2">
+            <a:schemeClr val="accent1">
+              <a:shade val="15000"/>
+            </a:schemeClr>
+          </a:lnRef>
+          <a:fillRef idx="1">
+            <a:schemeClr val="accent1"/>
+          </a:fillRef>
+          <a:effectRef idx="0">
+            <a:schemeClr val="accent1"/>
+          </a:effectRef>
+          <a:fontRef idx="minor">
+            <a:schemeClr val="lt1"/>
+          </a:fontRef>
+        </p:style>
+        <p:txBody>
+          <a:bodyPr rtlCol="0" anchor="ctr"/>
+          <a:lstStyle/>
+          <a:p>
+            <a:pPr algn="ctr"/>
+            <a:endParaRPr lang="en-NL"/>
+          </a:p>
+        </p:txBody>
+      </p:sp>
+      <p:sp>
+        <p:nvSpPr>
+          <p:cNvPr id="7" name="TextBox 6">
+            <a:extLst>
+              <a:ext uri="{FF2B5EF4-FFF2-40B4-BE49-F238E27FC236}">
+                <a16:creationId xmlns:a16="http://schemas.microsoft.com/office/drawing/2014/main" id="{76693E6D-A54B-CBAD-9B11-75DAF7DF9060}"/>
+              </a:ext>
+            </a:extLst>
+          </p:cNvPr>
+          <p:cNvSpPr txBox="1"/>
+          <p:nvPr/>
+        </p:nvSpPr>
+        <p:spPr>
+          <a:xfrm>
+            <a:off x="1714500" y="5205301"/>
+            <a:ext cx="1495426" cy="400110"/>
+          </a:xfrm>
+          <a:prstGeom prst="rect">
+            <a:avLst/>
+          </a:prstGeom>
+          <a:noFill/>
+        </p:spPr>
+        <p:txBody>
+          <a:bodyPr wrap="square" rtlCol="0">
+            <a:spAutoFit/>
+          </a:bodyPr>
+          <a:lstStyle/>
+          <a:p>
+            <a:r>
+              <a:rPr lang="en-GB" sz="1000" dirty="0"/>
+              <a:t>Move selected commands up or down</a:t>
+            </a:r>
+            <a:endParaRPr lang="en-NL" sz="1000" dirty="0"/>
+          </a:p>
+        </p:txBody>
+      </p:sp>
+      <p:cxnSp>
+        <p:nvCxnSpPr>
+          <p:cNvPr id="8" name="Straight Arrow Connector 7">
+            <a:extLst>
+              <a:ext uri="{FF2B5EF4-FFF2-40B4-BE49-F238E27FC236}">
+                <a16:creationId xmlns:a16="http://schemas.microsoft.com/office/drawing/2014/main" id="{5CF8DDBD-DE36-4B71-6E0F-951D40D0A5DC}"/>
+              </a:ext>
+            </a:extLst>
+          </p:cNvPr>
+          <p:cNvCxnSpPr>
+            <a:cxnSpLocks/>
+            <a:stCxn id="7" idx="3"/>
+          </p:cNvCxnSpPr>
+          <p:nvPr/>
+        </p:nvCxnSpPr>
+        <p:spPr>
+          <a:xfrm flipV="1">
+            <a:off x="3209926" y="4305300"/>
+            <a:ext cx="3206749" cy="1100056"/>
+          </a:xfrm>
+          <a:prstGeom prst="straightConnector1">
+            <a:avLst/>
+          </a:prstGeom>
+          <a:ln>
+            <a:tailEnd type="triangle"/>
+          </a:ln>
+        </p:spPr>
+        <p:style>
+          <a:lnRef idx="2">
+            <a:schemeClr val="accent1"/>
+          </a:lnRef>
+          <a:fillRef idx="0">
+            <a:schemeClr val="accent1"/>
+          </a:fillRef>
+          <a:effectRef idx="1">
+            <a:schemeClr val="accent1"/>
+          </a:effectRef>
+          <a:fontRef idx="minor">
+            <a:schemeClr val="tx1"/>
+          </a:fontRef>
+        </p:style>
+      </p:cxnSp>
+      <p:sp>
+        <p:nvSpPr>
+          <p:cNvPr id="10" name="Rectangle 9">
+            <a:extLst>
+              <a:ext uri="{FF2B5EF4-FFF2-40B4-BE49-F238E27FC236}">
+                <a16:creationId xmlns:a16="http://schemas.microsoft.com/office/drawing/2014/main" id="{8849A743-CE49-A9A3-BAD8-3B5B48786840}"/>
+              </a:ext>
+            </a:extLst>
+          </p:cNvPr>
+          <p:cNvSpPr/>
+          <p:nvPr/>
+        </p:nvSpPr>
+        <p:spPr>
+          <a:xfrm>
+            <a:off x="8499474" y="4178300"/>
+            <a:ext cx="222251" cy="349250"/>
+          </a:xfrm>
+          <a:prstGeom prst="rect">
+            <a:avLst/>
+          </a:prstGeom>
+          <a:noFill/>
+          <a:ln>
+            <a:solidFill>
+              <a:srgbClr val="FF0000"/>
+            </a:solidFill>
+          </a:ln>
+        </p:spPr>
+        <p:style>
+          <a:lnRef idx="2">
+            <a:schemeClr val="accent1">
+              <a:shade val="15000"/>
+            </a:schemeClr>
+          </a:lnRef>
+          <a:fillRef idx="1">
+            <a:schemeClr val="accent1"/>
+          </a:fillRef>
+          <a:effectRef idx="0">
+            <a:schemeClr val="accent1"/>
+          </a:effectRef>
+          <a:fontRef idx="minor">
+            <a:schemeClr val="lt1"/>
+          </a:fontRef>
+        </p:style>
+        <p:txBody>
+          <a:bodyPr rtlCol="0" anchor="ctr"/>
+          <a:lstStyle/>
+          <a:p>
+            <a:pPr algn="ctr"/>
+            <a:endParaRPr lang="en-NL"/>
+          </a:p>
+        </p:txBody>
+      </p:sp>
+      <p:sp>
+        <p:nvSpPr>
+          <p:cNvPr id="11" name="TextBox 10">
+            <a:extLst>
+              <a:ext uri="{FF2B5EF4-FFF2-40B4-BE49-F238E27FC236}">
+                <a16:creationId xmlns:a16="http://schemas.microsoft.com/office/drawing/2014/main" id="{7D0E4ABC-16AC-30A1-E0A6-6F28CD8A0E36}"/>
+              </a:ext>
+            </a:extLst>
+          </p:cNvPr>
+          <p:cNvSpPr txBox="1"/>
+          <p:nvPr/>
+        </p:nvSpPr>
+        <p:spPr>
+          <a:xfrm>
+            <a:off x="9518650" y="4171950"/>
+            <a:ext cx="1333002" cy="400110"/>
+          </a:xfrm>
+          <a:prstGeom prst="rect">
+            <a:avLst/>
+          </a:prstGeom>
+          <a:noFill/>
+        </p:spPr>
+        <p:txBody>
+          <a:bodyPr wrap="square" rtlCol="0">
+            <a:spAutoFit/>
+          </a:bodyPr>
+          <a:lstStyle/>
+          <a:p>
+            <a:r>
+              <a:rPr lang="en-GB" sz="1000" dirty="0"/>
+              <a:t>Move selected panel up or down</a:t>
+            </a:r>
+            <a:endParaRPr lang="en-NL" sz="1000" dirty="0"/>
+          </a:p>
+        </p:txBody>
+      </p:sp>
+      <p:cxnSp>
+        <p:nvCxnSpPr>
+          <p:cNvPr id="12" name="Straight Arrow Connector 11">
+            <a:extLst>
+              <a:ext uri="{FF2B5EF4-FFF2-40B4-BE49-F238E27FC236}">
+                <a16:creationId xmlns:a16="http://schemas.microsoft.com/office/drawing/2014/main" id="{7A50597E-E43E-0E01-8A60-BFEC80F0E591}"/>
+              </a:ext>
+            </a:extLst>
+          </p:cNvPr>
+          <p:cNvCxnSpPr>
+            <a:cxnSpLocks/>
+            <a:stCxn id="11" idx="1"/>
+            <a:endCxn id="10" idx="3"/>
+          </p:cNvCxnSpPr>
+          <p:nvPr/>
+        </p:nvCxnSpPr>
+        <p:spPr>
+          <a:xfrm flipH="1" flipV="1">
+            <a:off x="8721725" y="4352925"/>
+            <a:ext cx="796925" cy="19080"/>
+          </a:xfrm>
+          <a:prstGeom prst="straightConnector1">
+            <a:avLst/>
+          </a:prstGeom>
+          <a:ln>
+            <a:tailEnd type="triangle"/>
+          </a:ln>
+        </p:spPr>
+        <p:style>
+          <a:lnRef idx="2">
+            <a:schemeClr val="accent1"/>
+          </a:lnRef>
+          <a:fillRef idx="0">
+            <a:schemeClr val="accent1"/>
+          </a:fillRef>
+          <a:effectRef idx="1">
+            <a:schemeClr val="accent1"/>
+          </a:effectRef>
+          <a:fontRef idx="minor">
+            <a:schemeClr val="tx1"/>
+          </a:fontRef>
+        </p:style>
+      </p:cxnSp>
+      <p:sp>
+        <p:nvSpPr>
+          <p:cNvPr id="15" name="TextBox 14">
+            <a:extLst>
+              <a:ext uri="{FF2B5EF4-FFF2-40B4-BE49-F238E27FC236}">
+                <a16:creationId xmlns:a16="http://schemas.microsoft.com/office/drawing/2014/main" id="{D2A262BC-50FB-9E5A-C749-30D0C80D65BE}"/>
+              </a:ext>
+            </a:extLst>
+          </p:cNvPr>
+          <p:cNvSpPr txBox="1"/>
+          <p:nvPr/>
+        </p:nvSpPr>
+        <p:spPr>
+          <a:xfrm>
+            <a:off x="1939925" y="1988007"/>
+            <a:ext cx="1270001" cy="246221"/>
+          </a:xfrm>
+          <a:prstGeom prst="rect">
+            <a:avLst/>
+          </a:prstGeom>
+          <a:noFill/>
+        </p:spPr>
+        <p:txBody>
+          <a:bodyPr wrap="square" rtlCol="0">
+            <a:spAutoFit/>
+          </a:bodyPr>
+          <a:lstStyle/>
+          <a:p>
+            <a:r>
+              <a:rPr lang="en-GB" sz="1000" dirty="0"/>
+              <a:t>Select a workbench</a:t>
+            </a:r>
+            <a:endParaRPr lang="en-NL" sz="1000" dirty="0"/>
+          </a:p>
+        </p:txBody>
+      </p:sp>
+      <p:cxnSp>
+        <p:nvCxnSpPr>
+          <p:cNvPr id="16" name="Straight Arrow Connector 15">
+            <a:extLst>
+              <a:ext uri="{FF2B5EF4-FFF2-40B4-BE49-F238E27FC236}">
+                <a16:creationId xmlns:a16="http://schemas.microsoft.com/office/drawing/2014/main" id="{6EDA2DFE-951C-605D-0765-C7EE71793E3B}"/>
+              </a:ext>
+            </a:extLst>
+          </p:cNvPr>
+          <p:cNvCxnSpPr>
+            <a:cxnSpLocks/>
+            <a:stCxn id="15" idx="3"/>
+          </p:cNvCxnSpPr>
+          <p:nvPr/>
+        </p:nvCxnSpPr>
+        <p:spPr>
+          <a:xfrm>
+            <a:off x="3209926" y="2111118"/>
+            <a:ext cx="860424" cy="206632"/>
+          </a:xfrm>
+          <a:prstGeom prst="straightConnector1">
+            <a:avLst/>
+          </a:prstGeom>
+          <a:ln>
+            <a:tailEnd type="triangle"/>
+          </a:ln>
+        </p:spPr>
+        <p:style>
+          <a:lnRef idx="2">
+            <a:schemeClr val="accent1"/>
+          </a:lnRef>
+          <a:fillRef idx="0">
+            <a:schemeClr val="accent1"/>
+          </a:fillRef>
+          <a:effectRef idx="1">
+            <a:schemeClr val="accent1"/>
+          </a:effectRef>
+          <a:fontRef idx="minor">
+            <a:schemeClr val="tx1"/>
+          </a:fontRef>
+        </p:style>
+      </p:cxnSp>
+      <p:sp>
+        <p:nvSpPr>
+          <p:cNvPr id="19" name="TextBox 18">
+            <a:extLst>
+              <a:ext uri="{FF2B5EF4-FFF2-40B4-BE49-F238E27FC236}">
+                <a16:creationId xmlns:a16="http://schemas.microsoft.com/office/drawing/2014/main" id="{80F2365F-2700-38D1-FC6D-E82E66DF1A59}"/>
+              </a:ext>
+            </a:extLst>
+          </p:cNvPr>
+          <p:cNvSpPr txBox="1"/>
+          <p:nvPr/>
+        </p:nvSpPr>
+        <p:spPr>
+          <a:xfrm>
+            <a:off x="2146300" y="2541489"/>
+            <a:ext cx="1063626" cy="246221"/>
+          </a:xfrm>
+          <a:prstGeom prst="rect">
+            <a:avLst/>
+          </a:prstGeom>
+          <a:noFill/>
+        </p:spPr>
+        <p:txBody>
+          <a:bodyPr wrap="square" rtlCol="0">
+            <a:spAutoFit/>
+          </a:bodyPr>
+          <a:lstStyle/>
+          <a:p>
+            <a:r>
+              <a:rPr lang="en-GB" sz="1000" dirty="0"/>
+              <a:t>Select a toolbar</a:t>
+            </a:r>
+            <a:endParaRPr lang="en-NL" sz="1000" dirty="0"/>
+          </a:p>
+        </p:txBody>
+      </p:sp>
+      <p:cxnSp>
+        <p:nvCxnSpPr>
+          <p:cNvPr id="20" name="Straight Arrow Connector 19">
+            <a:extLst>
+              <a:ext uri="{FF2B5EF4-FFF2-40B4-BE49-F238E27FC236}">
+                <a16:creationId xmlns:a16="http://schemas.microsoft.com/office/drawing/2014/main" id="{D52C6726-B0FE-1352-AA96-C5D36351C53A}"/>
+              </a:ext>
+            </a:extLst>
+          </p:cNvPr>
+          <p:cNvCxnSpPr>
+            <a:cxnSpLocks/>
+            <a:stCxn id="19" idx="3"/>
+          </p:cNvCxnSpPr>
+          <p:nvPr/>
+        </p:nvCxnSpPr>
+        <p:spPr>
+          <a:xfrm flipV="1">
+            <a:off x="3209926" y="2584450"/>
+            <a:ext cx="854074" cy="80150"/>
+          </a:xfrm>
+          <a:prstGeom prst="straightConnector1">
+            <a:avLst/>
+          </a:prstGeom>
+          <a:ln>
+            <a:tailEnd type="triangle"/>
+          </a:ln>
+        </p:spPr>
+        <p:style>
+          <a:lnRef idx="2">
+            <a:schemeClr val="accent1"/>
+          </a:lnRef>
+          <a:fillRef idx="0">
+            <a:schemeClr val="accent1"/>
+          </a:fillRef>
+          <a:effectRef idx="1">
+            <a:schemeClr val="accent1"/>
+          </a:effectRef>
+          <a:fontRef idx="minor">
+            <a:schemeClr val="tx1"/>
+          </a:fontRef>
+        </p:style>
+      </p:cxnSp>
+      <p:sp>
+        <p:nvSpPr>
+          <p:cNvPr id="23" name="Rectangle 22">
+            <a:extLst>
+              <a:ext uri="{FF2B5EF4-FFF2-40B4-BE49-F238E27FC236}">
+                <a16:creationId xmlns:a16="http://schemas.microsoft.com/office/drawing/2014/main" id="{0EBF32B1-E4E5-AB8B-976F-FB81C7C16777}"/>
+              </a:ext>
+            </a:extLst>
+          </p:cNvPr>
+          <p:cNvSpPr/>
+          <p:nvPr/>
+        </p:nvSpPr>
+        <p:spPr>
+          <a:xfrm>
+            <a:off x="5181600" y="2905899"/>
+            <a:ext cx="781049" cy="2299401"/>
+          </a:xfrm>
+          <a:prstGeom prst="rect">
+            <a:avLst/>
+          </a:prstGeom>
+          <a:noFill/>
+          <a:ln>
+            <a:solidFill>
+              <a:srgbClr val="FF0000"/>
+            </a:solidFill>
+          </a:ln>
+        </p:spPr>
+        <p:style>
+          <a:lnRef idx="2">
+            <a:schemeClr val="accent1">
+              <a:shade val="15000"/>
+            </a:schemeClr>
+          </a:lnRef>
+          <a:fillRef idx="1">
+            <a:schemeClr val="accent1"/>
+          </a:fillRef>
+          <a:effectRef idx="0">
+            <a:schemeClr val="accent1"/>
+          </a:effectRef>
+          <a:fontRef idx="minor">
+            <a:schemeClr val="lt1"/>
+          </a:fontRef>
+        </p:style>
+        <p:txBody>
+          <a:bodyPr rtlCol="0" anchor="ctr"/>
+          <a:lstStyle/>
+          <a:p>
+            <a:pPr algn="ctr"/>
+            <a:endParaRPr lang="en-NL"/>
+          </a:p>
+        </p:txBody>
+      </p:sp>
+      <p:sp>
+        <p:nvSpPr>
+          <p:cNvPr id="25" name="TextBox 24">
+            <a:extLst>
+              <a:ext uri="{FF2B5EF4-FFF2-40B4-BE49-F238E27FC236}">
+                <a16:creationId xmlns:a16="http://schemas.microsoft.com/office/drawing/2014/main" id="{CD8A5B48-0E2A-EAAE-4B9F-C4FEAEB787C3}"/>
+              </a:ext>
+            </a:extLst>
+          </p:cNvPr>
+          <p:cNvSpPr txBox="1"/>
+          <p:nvPr/>
+        </p:nvSpPr>
+        <p:spPr>
+          <a:xfrm>
+            <a:off x="1835151" y="3238728"/>
+            <a:ext cx="1370012" cy="400110"/>
+          </a:xfrm>
+          <a:prstGeom prst="rect">
+            <a:avLst/>
+          </a:prstGeom>
+          <a:noFill/>
+        </p:spPr>
+        <p:txBody>
+          <a:bodyPr wrap="square" rtlCol="0">
+            <a:spAutoFit/>
+          </a:bodyPr>
+          <a:lstStyle/>
+          <a:p>
+            <a:r>
+              <a:rPr lang="en-GB" sz="1000" dirty="0"/>
+              <a:t>Double click to enter a different name</a:t>
+            </a:r>
+            <a:endParaRPr lang="en-NL" sz="1000" dirty="0"/>
+          </a:p>
+        </p:txBody>
+      </p:sp>
+      <p:cxnSp>
+        <p:nvCxnSpPr>
+          <p:cNvPr id="26" name="Straight Arrow Connector 25">
+            <a:extLst>
+              <a:ext uri="{FF2B5EF4-FFF2-40B4-BE49-F238E27FC236}">
+                <a16:creationId xmlns:a16="http://schemas.microsoft.com/office/drawing/2014/main" id="{E4AE347F-7C21-EA9D-EF3F-507C1BA1FBB7}"/>
+              </a:ext>
+            </a:extLst>
+          </p:cNvPr>
+          <p:cNvCxnSpPr>
+            <a:cxnSpLocks/>
+            <a:stCxn id="25" idx="3"/>
+          </p:cNvCxnSpPr>
+          <p:nvPr/>
+        </p:nvCxnSpPr>
+        <p:spPr>
+          <a:xfrm>
+            <a:off x="3205163" y="3438783"/>
+            <a:ext cx="250577" cy="0"/>
+          </a:xfrm>
+          <a:prstGeom prst="straightConnector1">
+            <a:avLst/>
+          </a:prstGeom>
+          <a:ln>
+            <a:tailEnd type="triangle"/>
+          </a:ln>
+        </p:spPr>
+        <p:style>
+          <a:lnRef idx="2">
+            <a:schemeClr val="accent1"/>
+          </a:lnRef>
+          <a:fillRef idx="0">
+            <a:schemeClr val="accent1"/>
+          </a:fillRef>
+          <a:effectRef idx="1">
+            <a:schemeClr val="accent1"/>
+          </a:effectRef>
+          <a:fontRef idx="minor">
+            <a:schemeClr val="tx1"/>
+          </a:fontRef>
+        </p:style>
+      </p:cxnSp>
+      <p:sp>
+        <p:nvSpPr>
+          <p:cNvPr id="29" name="Rectangle 28">
+            <a:extLst>
+              <a:ext uri="{FF2B5EF4-FFF2-40B4-BE49-F238E27FC236}">
+                <a16:creationId xmlns:a16="http://schemas.microsoft.com/office/drawing/2014/main" id="{CA79FF97-A44B-40D6-753F-1FA8B5449B0C}"/>
+              </a:ext>
+            </a:extLst>
+          </p:cNvPr>
+          <p:cNvSpPr/>
+          <p:nvPr/>
+        </p:nvSpPr>
+        <p:spPr>
+          <a:xfrm>
+            <a:off x="3455740" y="2905899"/>
+            <a:ext cx="1725860" cy="2299401"/>
+          </a:xfrm>
+          <a:prstGeom prst="rect">
+            <a:avLst/>
+          </a:prstGeom>
+          <a:noFill/>
+          <a:ln>
+            <a:solidFill>
+              <a:srgbClr val="FF0000"/>
+            </a:solidFill>
+          </a:ln>
+        </p:spPr>
+        <p:style>
+          <a:lnRef idx="2">
+            <a:schemeClr val="accent1">
+              <a:shade val="15000"/>
+            </a:schemeClr>
+          </a:lnRef>
+          <a:fillRef idx="1">
+            <a:schemeClr val="accent1"/>
+          </a:fillRef>
+          <a:effectRef idx="0">
+            <a:schemeClr val="accent1"/>
+          </a:effectRef>
+          <a:fontRef idx="minor">
+            <a:schemeClr val="lt1"/>
+          </a:fontRef>
+        </p:style>
+        <p:txBody>
+          <a:bodyPr rtlCol="0" anchor="ctr"/>
+          <a:lstStyle/>
+          <a:p>
+            <a:pPr algn="ctr"/>
+            <a:endParaRPr lang="en-NL"/>
+          </a:p>
+        </p:txBody>
+      </p:sp>
+      <p:sp>
+        <p:nvSpPr>
+          <p:cNvPr id="32" name="TextBox 31">
+            <a:extLst>
+              <a:ext uri="{FF2B5EF4-FFF2-40B4-BE49-F238E27FC236}">
+                <a16:creationId xmlns:a16="http://schemas.microsoft.com/office/drawing/2014/main" id="{E7F6705C-A6BB-4AC5-9F47-88F3611E6307}"/>
+              </a:ext>
+            </a:extLst>
+          </p:cNvPr>
+          <p:cNvSpPr txBox="1"/>
+          <p:nvPr/>
+        </p:nvSpPr>
+        <p:spPr>
+          <a:xfrm>
+            <a:off x="6729411" y="1314678"/>
+            <a:ext cx="1270001" cy="400110"/>
+          </a:xfrm>
+          <a:prstGeom prst="rect">
+            <a:avLst/>
+          </a:prstGeom>
+          <a:noFill/>
+        </p:spPr>
+        <p:txBody>
+          <a:bodyPr wrap="square" rtlCol="0">
+            <a:spAutoFit/>
+          </a:bodyPr>
+          <a:lstStyle/>
+          <a:p>
+            <a:r>
+              <a:rPr lang="en-GB" sz="1000" dirty="0"/>
+              <a:t>Set the size of the command buttons</a:t>
+            </a:r>
+            <a:endParaRPr lang="en-NL" sz="1000" dirty="0"/>
+          </a:p>
+        </p:txBody>
+      </p:sp>
+      <p:cxnSp>
+        <p:nvCxnSpPr>
+          <p:cNvPr id="33" name="Straight Arrow Connector 32">
+            <a:extLst>
+              <a:ext uri="{FF2B5EF4-FFF2-40B4-BE49-F238E27FC236}">
+                <a16:creationId xmlns:a16="http://schemas.microsoft.com/office/drawing/2014/main" id="{7BEE3392-FEA0-51F0-5FD8-40F705655C9E}"/>
+              </a:ext>
+            </a:extLst>
+          </p:cNvPr>
+          <p:cNvCxnSpPr>
+            <a:cxnSpLocks/>
+            <a:stCxn id="32" idx="2"/>
+          </p:cNvCxnSpPr>
+          <p:nvPr/>
+        </p:nvCxnSpPr>
+        <p:spPr>
+          <a:xfrm flipH="1">
+            <a:off x="5962649" y="1714788"/>
+            <a:ext cx="1401763" cy="1307812"/>
+          </a:xfrm>
+          <a:prstGeom prst="straightConnector1">
+            <a:avLst/>
+          </a:prstGeom>
+          <a:ln>
+            <a:tailEnd type="triangle"/>
+          </a:ln>
+        </p:spPr>
+        <p:style>
+          <a:lnRef idx="2">
+            <a:schemeClr val="accent1"/>
+          </a:lnRef>
+          <a:fillRef idx="0">
+            <a:schemeClr val="accent1"/>
+          </a:fillRef>
+          <a:effectRef idx="1">
+            <a:schemeClr val="accent1"/>
+          </a:effectRef>
+          <a:fontRef idx="minor">
+            <a:schemeClr val="tx1"/>
+          </a:fontRef>
+        </p:style>
+      </p:cxnSp>
+      <p:sp>
+        <p:nvSpPr>
+          <p:cNvPr id="40" name="TextBox 39">
+            <a:extLst>
+              <a:ext uri="{FF2B5EF4-FFF2-40B4-BE49-F238E27FC236}">
+                <a16:creationId xmlns:a16="http://schemas.microsoft.com/office/drawing/2014/main" id="{A1C6EE6A-369A-8CF1-E08A-E71DB840FE2E}"/>
+              </a:ext>
+            </a:extLst>
+          </p:cNvPr>
+          <p:cNvSpPr txBox="1"/>
+          <p:nvPr/>
+        </p:nvSpPr>
+        <p:spPr>
+          <a:xfrm>
+            <a:off x="5439274" y="6237287"/>
+            <a:ext cx="1333002" cy="246221"/>
+          </a:xfrm>
+          <a:prstGeom prst="rect">
+            <a:avLst/>
+          </a:prstGeom>
+          <a:noFill/>
+        </p:spPr>
+        <p:txBody>
+          <a:bodyPr wrap="square" rtlCol="0">
+            <a:spAutoFit/>
+          </a:bodyPr>
+          <a:lstStyle/>
+          <a:p>
+            <a:r>
+              <a:rPr lang="en-GB" sz="1000" dirty="0"/>
+              <a:t>Remove a separator</a:t>
+            </a:r>
+            <a:endParaRPr lang="en-NL" sz="1000" dirty="0"/>
+          </a:p>
+        </p:txBody>
+      </p:sp>
+      <p:cxnSp>
+        <p:nvCxnSpPr>
+          <p:cNvPr id="41" name="Straight Arrow Connector 40">
+            <a:extLst>
+              <a:ext uri="{FF2B5EF4-FFF2-40B4-BE49-F238E27FC236}">
+                <a16:creationId xmlns:a16="http://schemas.microsoft.com/office/drawing/2014/main" id="{9E69958B-36AF-52C3-C683-809DBB5734C4}"/>
+              </a:ext>
+            </a:extLst>
+          </p:cNvPr>
+          <p:cNvCxnSpPr>
+            <a:cxnSpLocks/>
+            <a:stCxn id="40" idx="0"/>
+          </p:cNvCxnSpPr>
+          <p:nvPr/>
+        </p:nvCxnSpPr>
+        <p:spPr>
+          <a:xfrm flipH="1" flipV="1">
+            <a:off x="5537200" y="5924550"/>
+            <a:ext cx="568575" cy="312737"/>
+          </a:xfrm>
+          <a:prstGeom prst="straightConnector1">
+            <a:avLst/>
+          </a:prstGeom>
+          <a:ln>
+            <a:tailEnd type="triangle"/>
+          </a:ln>
+        </p:spPr>
+        <p:style>
+          <a:lnRef idx="2">
+            <a:schemeClr val="accent1"/>
+          </a:lnRef>
+          <a:fillRef idx="0">
+            <a:schemeClr val="accent1"/>
+          </a:fillRef>
+          <a:effectRef idx="1">
+            <a:schemeClr val="accent1"/>
+          </a:effectRef>
+          <a:fontRef idx="minor">
+            <a:schemeClr val="tx1"/>
+          </a:fontRef>
+        </p:style>
+      </p:cxnSp>
+      <p:sp>
+        <p:nvSpPr>
+          <p:cNvPr id="45" name="TextBox 44">
+            <a:extLst>
+              <a:ext uri="{FF2B5EF4-FFF2-40B4-BE49-F238E27FC236}">
+                <a16:creationId xmlns:a16="http://schemas.microsoft.com/office/drawing/2014/main" id="{151FCCD5-C3B6-2C70-8C67-00664F1DE6A5}"/>
+              </a:ext>
+            </a:extLst>
+          </p:cNvPr>
+          <p:cNvSpPr txBox="1"/>
+          <p:nvPr/>
+        </p:nvSpPr>
+        <p:spPr>
+          <a:xfrm>
+            <a:off x="3994150" y="6237287"/>
+            <a:ext cx="1476873" cy="400110"/>
+          </a:xfrm>
+          <a:prstGeom prst="rect">
+            <a:avLst/>
+          </a:prstGeom>
+          <a:noFill/>
+        </p:spPr>
+        <p:txBody>
+          <a:bodyPr wrap="square" rtlCol="0">
+            <a:spAutoFit/>
+          </a:bodyPr>
+          <a:lstStyle/>
+          <a:p>
+            <a:r>
+              <a:rPr lang="en-GB" sz="1000" dirty="0"/>
+              <a:t>Add a separator above the selected command</a:t>
+            </a:r>
+            <a:endParaRPr lang="en-NL" sz="1000" dirty="0"/>
+          </a:p>
+        </p:txBody>
+      </p:sp>
+      <p:cxnSp>
+        <p:nvCxnSpPr>
+          <p:cNvPr id="46" name="Straight Arrow Connector 45">
+            <a:extLst>
+              <a:ext uri="{FF2B5EF4-FFF2-40B4-BE49-F238E27FC236}">
+                <a16:creationId xmlns:a16="http://schemas.microsoft.com/office/drawing/2014/main" id="{197C9133-9132-02B2-D1DC-642DEDE9F995}"/>
+              </a:ext>
+            </a:extLst>
+          </p:cNvPr>
+          <p:cNvCxnSpPr>
+            <a:cxnSpLocks/>
+            <a:stCxn id="45" idx="0"/>
+          </p:cNvCxnSpPr>
+          <p:nvPr/>
+        </p:nvCxnSpPr>
+        <p:spPr>
+          <a:xfrm flipH="1" flipV="1">
+            <a:off x="4727576" y="5871762"/>
+            <a:ext cx="5011" cy="365525"/>
+          </a:xfrm>
+          <a:prstGeom prst="straightConnector1">
+            <a:avLst/>
+          </a:prstGeom>
+          <a:ln>
+            <a:tailEnd type="triangle"/>
+          </a:ln>
+        </p:spPr>
+        <p:style>
+          <a:lnRef idx="2">
+            <a:schemeClr val="accent1"/>
+          </a:lnRef>
+          <a:fillRef idx="0">
+            <a:schemeClr val="accent1"/>
+          </a:fillRef>
+          <a:effectRef idx="1">
+            <a:schemeClr val="accent1"/>
+          </a:effectRef>
+          <a:fontRef idx="minor">
+            <a:schemeClr val="tx1"/>
+          </a:fontRef>
+        </p:style>
+      </p:cxnSp>
+    </p:spTree>
+    <p:extLst>
+      <p:ext uri="{BB962C8B-B14F-4D97-AF65-F5344CB8AC3E}">
+        <p14:creationId xmlns:p14="http://schemas.microsoft.com/office/powerpoint/2010/main" val="3214827965"/>
+      </p:ext>
+    </p:extLst>
+  </p:cSld>
+  <p:clrMapOvr>
+    <a:masterClrMapping/>
+  </p:clrMapOvr>
+</p:sld>
+</file>
+
+<file path=ppt/slides/slide9.xml><?xml version="1.0" encoding="utf-8"?>
+<p:sld xmlns:a="http://schemas.openxmlformats.org/drawingml/2006/main" xmlns:r="http://schemas.openxmlformats.org/officeDocument/2006/relationships" xmlns:p="http://schemas.openxmlformats.org/presentationml/2006/main">
+  <p:cSld>
+    <p:spTree>
+      <p:nvGrpSpPr>
+        <p:cNvPr id="1" name=""/>
+        <p:cNvGrpSpPr/>
+        <p:nvPr/>
+      </p:nvGrpSpPr>
+      <p:grpSpPr>
+        <a:xfrm>
+          <a:off x="0" y="0"/>
+          <a:ext cx="0" cy="0"/>
+          <a:chOff x="0" y="0"/>
+          <a:chExt cx="0" cy="0"/>
+        </a:xfrm>
+      </p:grpSpPr>
+      <p:pic>
+        <p:nvPicPr>
+          <p:cNvPr id="5" name="Content Placeholder 4" descr="A screenshot of a computer&#10;&#10;Description automatically generated">
+            <a:extLst>
+              <a:ext uri="{FF2B5EF4-FFF2-40B4-BE49-F238E27FC236}">
+                <a16:creationId xmlns:a16="http://schemas.microsoft.com/office/drawing/2014/main" id="{1B0A1E32-CACF-A726-40FF-ECE8A88B079F}"/>
+              </a:ext>
+            </a:extLst>
+          </p:cNvPr>
+          <p:cNvPicPr>
+            <a:picLocks noGrp="1" noChangeAspect="1"/>
+          </p:cNvPicPr>
+          <p:nvPr>
+            <p:ph idx="1"/>
+          </p:nvPr>
+        </p:nvPicPr>
+        <p:blipFill>
+          <a:blip r:embed="rId2">
+            <a:extLst>
+              <a:ext uri="{28A0092B-C50C-407E-A947-70E740481C1C}">
+                <a14:useLocalDpi xmlns:a14="http://schemas.microsoft.com/office/drawing/2010/main" val="0"/>
+              </a:ext>
+            </a:extLst>
+          </a:blip>
+          <a:stretch>
+            <a:fillRect/>
+          </a:stretch>
+        </p:blipFill>
+        <p:spPr>
+          <a:xfrm>
+            <a:off x="3949110" y="1825625"/>
+            <a:ext cx="4293780" cy="4351338"/>
+          </a:xfrm>
+        </p:spPr>
+      </p:pic>
+    </p:spTree>
+    <p:extLst>
+      <p:ext uri="{BB962C8B-B14F-4D97-AF65-F5344CB8AC3E}">
+        <p14:creationId xmlns:p14="http://schemas.microsoft.com/office/powerpoint/2010/main" val="3493196778"/>
       </p:ext>
     </p:extLst>
   </p:cSld>

</xml_diff>